<commit_message>
added notes, moved slides around
</commit_message>
<xml_diff>
--- a/MABUG2014-8743.pptx
+++ b/MABUG2014-8743.pptx
@@ -5,10 +5,10 @@
     <p:sldMasterId id="2147483699" r:id="rId1"/>
   </p:sldMasterIdLst>
   <p:notesMasterIdLst>
-    <p:notesMasterId r:id="rId30"/>
+    <p:notesMasterId r:id="rId31"/>
   </p:notesMasterIdLst>
   <p:handoutMasterIdLst>
-    <p:handoutMasterId r:id="rId31"/>
+    <p:handoutMasterId r:id="rId32"/>
   </p:handoutMasterIdLst>
   <p:sldIdLst>
     <p:sldId id="382" r:id="rId2"/>
@@ -22,23 +22,24 @@
     <p:sldId id="440" r:id="rId10"/>
     <p:sldId id="424" r:id="rId11"/>
     <p:sldId id="383" r:id="rId12"/>
-    <p:sldId id="425" r:id="rId13"/>
-    <p:sldId id="389" r:id="rId14"/>
-    <p:sldId id="442" r:id="rId15"/>
-    <p:sldId id="390" r:id="rId16"/>
-    <p:sldId id="391" r:id="rId17"/>
-    <p:sldId id="426" r:id="rId18"/>
-    <p:sldId id="429" r:id="rId19"/>
-    <p:sldId id="435" r:id="rId20"/>
-    <p:sldId id="436" r:id="rId21"/>
-    <p:sldId id="443" r:id="rId22"/>
-    <p:sldId id="437" r:id="rId23"/>
-    <p:sldId id="438" r:id="rId24"/>
-    <p:sldId id="439" r:id="rId25"/>
-    <p:sldId id="416" r:id="rId26"/>
-    <p:sldId id="348" r:id="rId27"/>
+    <p:sldId id="444" r:id="rId13"/>
+    <p:sldId id="425" r:id="rId14"/>
+    <p:sldId id="389" r:id="rId15"/>
+    <p:sldId id="442" r:id="rId16"/>
+    <p:sldId id="390" r:id="rId17"/>
+    <p:sldId id="391" r:id="rId18"/>
+    <p:sldId id="426" r:id="rId19"/>
+    <p:sldId id="429" r:id="rId20"/>
+    <p:sldId id="435" r:id="rId21"/>
+    <p:sldId id="436" r:id="rId22"/>
+    <p:sldId id="443" r:id="rId23"/>
+    <p:sldId id="437" r:id="rId24"/>
+    <p:sldId id="438" r:id="rId25"/>
+    <p:sldId id="439" r:id="rId26"/>
+    <p:sldId id="416" r:id="rId27"/>
     <p:sldId id="441" r:id="rId28"/>
-    <p:sldId id="420" r:id="rId29"/>
+    <p:sldId id="348" r:id="rId29"/>
+    <p:sldId id="420" r:id="rId30"/>
   </p:sldIdLst>
   <p:sldSz cx="9144000" cy="6858000" type="screen4x3"/>
   <p:notesSz cx="6858000" cy="9144000"/>
@@ -252,7 +253,7 @@
           <a:p>
             <a:fld id="{E3B8B232-C17E-47AB-B622-A7FEBAD2BE1C}" type="datetimeFigureOut">
               <a:rPr lang="en-US" smtClean="0"/>
-              <a:t>9/27/14</a:t>
+              <a:t>9/28/14</a:t>
             </a:fld>
             <a:endParaRPr lang="en-US"/>
           </a:p>
@@ -902,25 +903,19 @@
           <a:p>
             <a:r>
               <a:rPr lang="en-US" dirty="0" smtClean="0"/>
-              <a:t>Howard </a:t>
-            </a:r>
-            <a:r>
-              <a:rPr lang="en-US" dirty="0" err="1" smtClean="0"/>
-              <a:t>Frysinger</a:t>
+              <a:t>App is deployed if there are NO errors</a:t>
+            </a:r>
+          </a:p>
+          <a:p>
+            <a:r>
+              <a:rPr lang="en-US" dirty="0" smtClean="0"/>
+              <a:t>Jenkins</a:t>
             </a:r>
             <a:r>
               <a:rPr lang="en-US" baseline="0" dirty="0" smtClean="0"/>
-              <a:t> is on Facebook, I </a:t>
-            </a:r>
-            <a:r>
-              <a:rPr lang="en-US" baseline="0" dirty="0" err="1" smtClean="0"/>
-              <a:t>googled</a:t>
-            </a:r>
-            <a:r>
-              <a:rPr lang="en-US" baseline="0" smtClean="0"/>
-              <a:t> him</a:t>
-            </a:r>
-            <a:endParaRPr lang="en-US"/>
+              <a:t> can communicate using various methods – jabber, email…</a:t>
+            </a:r>
+            <a:endParaRPr lang="en-US" dirty="0"/>
           </a:p>
         </p:txBody>
       </p:sp>
@@ -942,7 +937,7 @@
             <a:fld id="{B5CF5F01-DE69-42C6-A6BC-27980DDEA61B}" type="slidenum">
               <a:rPr lang="en-US" smtClean="0"/>
               <a:pPr/>
-              <a:t>22</a:t>
+              <a:t>16</a:t>
             </a:fld>
             <a:endParaRPr lang="en-US"/>
           </a:p>
@@ -951,7 +946,7 @@
     </p:spTree>
     <p:extLst>
       <p:ext uri="{BB962C8B-B14F-4D97-AF65-F5344CB8AC3E}">
-        <p14:creationId xmlns:p14="http://schemas.microsoft.com/office/powerpoint/2010/main" val="4161487697"/>
+        <p14:creationId xmlns:p14="http://schemas.microsoft.com/office/powerpoint/2010/main" val="681828960"/>
       </p:ext>
     </p:extLst>
   </p:cSld>
@@ -1005,7 +1000,11 @@
           <a:bodyPr/>
           <a:lstStyle/>
           <a:p>
-            <a:endParaRPr lang="en-US"/>
+            <a:r>
+              <a:rPr lang="en-US" dirty="0" smtClean="0"/>
+              <a:t>Show Packer &amp; Vagrant Websites on Chrome</a:t>
+            </a:r>
+            <a:endParaRPr lang="en-US" dirty="0"/>
           </a:p>
         </p:txBody>
       </p:sp>
@@ -1027,7 +1026,197 @@
             <a:fld id="{B5CF5F01-DE69-42C6-A6BC-27980DDEA61B}" type="slidenum">
               <a:rPr lang="en-US" smtClean="0"/>
               <a:pPr/>
-              <a:t>26</a:t>
+              <a:t>18</a:t>
+            </a:fld>
+            <a:endParaRPr lang="en-US"/>
+          </a:p>
+        </p:txBody>
+      </p:sp>
+    </p:spTree>
+    <p:extLst>
+      <p:ext uri="{BB962C8B-B14F-4D97-AF65-F5344CB8AC3E}">
+        <p14:creationId xmlns:p14="http://schemas.microsoft.com/office/powerpoint/2010/main" val="2698525336"/>
+      </p:ext>
+    </p:extLst>
+  </p:cSld>
+  <p:clrMapOvr>
+    <a:masterClrMapping/>
+  </p:clrMapOvr>
+</p:notes>
+</file>
+
+<file path=ppt/notesSlides/notesSlide12.xml><?xml version="1.0" encoding="utf-8"?>
+<p:notes xmlns:a="http://schemas.openxmlformats.org/drawingml/2006/main" xmlns:r="http://schemas.openxmlformats.org/officeDocument/2006/relationships" xmlns:p="http://schemas.openxmlformats.org/presentationml/2006/main">
+  <p:cSld>
+    <p:spTree>
+      <p:nvGrpSpPr>
+        <p:cNvPr id="1" name=""/>
+        <p:cNvGrpSpPr/>
+        <p:nvPr/>
+      </p:nvGrpSpPr>
+      <p:grpSpPr>
+        <a:xfrm>
+          <a:off x="0" y="0"/>
+          <a:ext cx="0" cy="0"/>
+          <a:chOff x="0" y="0"/>
+          <a:chExt cx="0" cy="0"/>
+        </a:xfrm>
+      </p:grpSpPr>
+      <p:sp>
+        <p:nvSpPr>
+          <p:cNvPr id="2" name="Slide Image Placeholder 1"/>
+          <p:cNvSpPr>
+            <a:spLocks noGrp="1" noRot="1" noChangeAspect="1"/>
+          </p:cNvSpPr>
+          <p:nvPr>
+            <p:ph type="sldImg"/>
+          </p:nvPr>
+        </p:nvSpPr>
+        <p:spPr/>
+      </p:sp>
+      <p:sp>
+        <p:nvSpPr>
+          <p:cNvPr id="3" name="Notes Placeholder 2"/>
+          <p:cNvSpPr>
+            <a:spLocks noGrp="1"/>
+          </p:cNvSpPr>
+          <p:nvPr>
+            <p:ph type="body" idx="1"/>
+          </p:nvPr>
+        </p:nvSpPr>
+        <p:spPr/>
+        <p:txBody>
+          <a:bodyPr/>
+          <a:lstStyle/>
+          <a:p>
+            <a:r>
+              <a:rPr lang="en-US" dirty="0" smtClean="0"/>
+              <a:t>Howard </a:t>
+            </a:r>
+            <a:r>
+              <a:rPr lang="en-US" dirty="0" err="1" smtClean="0"/>
+              <a:t>Frysinger</a:t>
+            </a:r>
+            <a:r>
+              <a:rPr lang="en-US" baseline="0" dirty="0" smtClean="0"/>
+              <a:t> is on Facebook, I </a:t>
+            </a:r>
+            <a:r>
+              <a:rPr lang="en-US" baseline="0" dirty="0" err="1" smtClean="0"/>
+              <a:t>googled</a:t>
+            </a:r>
+            <a:r>
+              <a:rPr lang="en-US" baseline="0" smtClean="0"/>
+              <a:t> him</a:t>
+            </a:r>
+            <a:endParaRPr lang="en-US"/>
+          </a:p>
+        </p:txBody>
+      </p:sp>
+      <p:sp>
+        <p:nvSpPr>
+          <p:cNvPr id="4" name="Slide Number Placeholder 3"/>
+          <p:cNvSpPr>
+            <a:spLocks noGrp="1"/>
+          </p:cNvSpPr>
+          <p:nvPr>
+            <p:ph type="sldNum" sz="quarter" idx="10"/>
+          </p:nvPr>
+        </p:nvSpPr>
+        <p:spPr/>
+        <p:txBody>
+          <a:bodyPr/>
+          <a:lstStyle/>
+          <a:p>
+            <a:fld id="{B5CF5F01-DE69-42C6-A6BC-27980DDEA61B}" type="slidenum">
+              <a:rPr lang="en-US" smtClean="0"/>
+              <a:pPr/>
+              <a:t>23</a:t>
+            </a:fld>
+            <a:endParaRPr lang="en-US"/>
+          </a:p>
+        </p:txBody>
+      </p:sp>
+    </p:spTree>
+    <p:extLst>
+      <p:ext uri="{BB962C8B-B14F-4D97-AF65-F5344CB8AC3E}">
+        <p14:creationId xmlns:p14="http://schemas.microsoft.com/office/powerpoint/2010/main" val="4161487697"/>
+      </p:ext>
+    </p:extLst>
+  </p:cSld>
+  <p:clrMapOvr>
+    <a:masterClrMapping/>
+  </p:clrMapOvr>
+</p:notes>
+</file>
+
+<file path=ppt/notesSlides/notesSlide13.xml><?xml version="1.0" encoding="utf-8"?>
+<p:notes xmlns:a="http://schemas.openxmlformats.org/drawingml/2006/main" xmlns:r="http://schemas.openxmlformats.org/officeDocument/2006/relationships" xmlns:p="http://schemas.openxmlformats.org/presentationml/2006/main">
+  <p:cSld>
+    <p:spTree>
+      <p:nvGrpSpPr>
+        <p:cNvPr id="1" name=""/>
+        <p:cNvGrpSpPr/>
+        <p:nvPr/>
+      </p:nvGrpSpPr>
+      <p:grpSpPr>
+        <a:xfrm>
+          <a:off x="0" y="0"/>
+          <a:ext cx="0" cy="0"/>
+          <a:chOff x="0" y="0"/>
+          <a:chExt cx="0" cy="0"/>
+        </a:xfrm>
+      </p:grpSpPr>
+      <p:sp>
+        <p:nvSpPr>
+          <p:cNvPr id="2" name="Slide Image Placeholder 1"/>
+          <p:cNvSpPr>
+            <a:spLocks noGrp="1" noRot="1" noChangeAspect="1"/>
+          </p:cNvSpPr>
+          <p:nvPr>
+            <p:ph type="sldImg"/>
+          </p:nvPr>
+        </p:nvSpPr>
+        <p:spPr/>
+      </p:sp>
+      <p:sp>
+        <p:nvSpPr>
+          <p:cNvPr id="3" name="Notes Placeholder 2"/>
+          <p:cNvSpPr>
+            <a:spLocks noGrp="1"/>
+          </p:cNvSpPr>
+          <p:nvPr>
+            <p:ph type="body" idx="1"/>
+          </p:nvPr>
+        </p:nvSpPr>
+        <p:spPr/>
+        <p:txBody>
+          <a:bodyPr/>
+          <a:lstStyle/>
+          <a:p>
+            <a:endParaRPr lang="en-US"/>
+          </a:p>
+        </p:txBody>
+      </p:sp>
+      <p:sp>
+        <p:nvSpPr>
+          <p:cNvPr id="4" name="Slide Number Placeholder 3"/>
+          <p:cNvSpPr>
+            <a:spLocks noGrp="1"/>
+          </p:cNvSpPr>
+          <p:nvPr>
+            <p:ph type="sldNum" sz="quarter" idx="10"/>
+          </p:nvPr>
+        </p:nvSpPr>
+        <p:spPr/>
+        <p:txBody>
+          <a:bodyPr/>
+          <a:lstStyle/>
+          <a:p>
+            <a:fld id="{B5CF5F01-DE69-42C6-A6BC-27980DDEA61B}" type="slidenum">
+              <a:rPr lang="en-US" smtClean="0"/>
+              <a:pPr/>
+              <a:t>28</a:t>
             </a:fld>
             <a:endParaRPr lang="en-US"/>
           </a:p>
@@ -1479,6 +1668,14 @@
           <a:bodyPr/>
           <a:lstStyle/>
           <a:p>
+            <a:r>
+              <a:rPr lang="en-US" dirty="0" smtClean="0"/>
+              <a:t>Let’s look at these</a:t>
+            </a:r>
+            <a:r>
+              <a:rPr lang="en-US" baseline="0" dirty="0" smtClean="0"/>
+              <a:t> “opportunities”, one at a time.</a:t>
+            </a:r>
             <a:endParaRPr lang="en-US" dirty="0"/>
           </a:p>
         </p:txBody>
@@ -1501,7 +1698,7 @@
             <a:fld id="{B5CF5F01-DE69-42C6-A6BC-27980DDEA61B}" type="slidenum">
               <a:rPr lang="en-US" smtClean="0"/>
               <a:pPr/>
-              <a:t>8</a:t>
+              <a:t>7</a:t>
             </a:fld>
             <a:endParaRPr lang="en-US"/>
           </a:p>
@@ -1510,7 +1707,7 @@
     </p:spTree>
     <p:extLst>
       <p:ext uri="{BB962C8B-B14F-4D97-AF65-F5344CB8AC3E}">
-        <p14:creationId xmlns:p14="http://schemas.microsoft.com/office/powerpoint/2010/main" val="775823027"/>
+        <p14:creationId xmlns:p14="http://schemas.microsoft.com/office/powerpoint/2010/main" val="1831456420"/>
       </p:ext>
     </p:extLst>
   </p:cSld>
@@ -1566,11 +1763,17 @@
           <a:p>
             <a:r>
               <a:rPr lang="en-US" dirty="0" smtClean="0"/>
-              <a:t>Publicly</a:t>
+              <a:t>Using their version of Java and Grails on their Desktop OS</a:t>
+            </a:r>
+          </a:p>
+          <a:p>
+            <a:r>
+              <a:rPr lang="en-US" dirty="0" smtClean="0"/>
+              <a:t>This worked</a:t>
             </a:r>
             <a:r>
               <a:rPr lang="en-US" baseline="0" dirty="0" smtClean="0"/>
-              <a:t> shame via jabber conference room.  Never leave a build broke</a:t>
+              <a:t> most of the time…</a:t>
             </a:r>
             <a:endParaRPr lang="en-US" dirty="0"/>
           </a:p>
@@ -1594,7 +1797,7 @@
             <a:fld id="{B5CF5F01-DE69-42C6-A6BC-27980DDEA61B}" type="slidenum">
               <a:rPr lang="en-US" smtClean="0"/>
               <a:pPr/>
-              <a:t>12</a:t>
+              <a:t>8</a:t>
             </a:fld>
             <a:endParaRPr lang="en-US"/>
           </a:p>
@@ -1603,7 +1806,7 @@
     </p:spTree>
     <p:extLst>
       <p:ext uri="{BB962C8B-B14F-4D97-AF65-F5344CB8AC3E}">
-        <p14:creationId xmlns:p14="http://schemas.microsoft.com/office/powerpoint/2010/main" val="694195417"/>
+        <p14:creationId xmlns:p14="http://schemas.microsoft.com/office/powerpoint/2010/main" val="775823027"/>
       </p:ext>
     </p:extLst>
   </p:cSld>
@@ -1659,11 +1862,21 @@
           <a:p>
             <a:r>
               <a:rPr lang="en-US" dirty="0" smtClean="0"/>
-              <a:t>Able</a:t>
+              <a:t>Publicly</a:t>
             </a:r>
             <a:r>
               <a:rPr lang="en-US" baseline="0" dirty="0" smtClean="0"/>
-              <a:t> to select version of Grails to build with</a:t>
+              <a:t> shame via jabber conference room.  Never leave a build </a:t>
+            </a:r>
+            <a:r>
+              <a:rPr lang="en-US" baseline="0" dirty="0" smtClean="0"/>
+              <a:t>broke</a:t>
+            </a:r>
+          </a:p>
+          <a:p>
+            <a:r>
+              <a:rPr lang="en-US" baseline="0" dirty="0" smtClean="0"/>
+              <a:t>Show Jenkins Website on Chrome</a:t>
             </a:r>
             <a:endParaRPr lang="en-US" dirty="0"/>
           </a:p>
@@ -1687,7 +1900,7 @@
             <a:fld id="{B5CF5F01-DE69-42C6-A6BC-27980DDEA61B}" type="slidenum">
               <a:rPr lang="en-US" smtClean="0"/>
               <a:pPr/>
-              <a:t>14</a:t>
+              <a:t>13</a:t>
             </a:fld>
             <a:endParaRPr lang="en-US"/>
           </a:p>
@@ -1696,7 +1909,7 @@
     </p:spTree>
     <p:extLst>
       <p:ext uri="{BB962C8B-B14F-4D97-AF65-F5344CB8AC3E}">
-        <p14:creationId xmlns:p14="http://schemas.microsoft.com/office/powerpoint/2010/main" val="874158331"/>
+        <p14:creationId xmlns:p14="http://schemas.microsoft.com/office/powerpoint/2010/main" val="694195417"/>
       </p:ext>
     </p:extLst>
   </p:cSld>
@@ -1752,17 +1965,11 @@
           <a:p>
             <a:r>
               <a:rPr lang="en-US" dirty="0" smtClean="0"/>
-              <a:t>App is deployed if there are NO errors</a:t>
-            </a:r>
-          </a:p>
-          <a:p>
-            <a:r>
-              <a:rPr lang="en-US" dirty="0" smtClean="0"/>
-              <a:t>Jenkins</a:t>
+              <a:t>Able</a:t>
             </a:r>
             <a:r>
               <a:rPr lang="en-US" baseline="0" dirty="0" smtClean="0"/>
-              <a:t> can communicate using various methods – jabber, email…</a:t>
+              <a:t> to select version of Grails to build with</a:t>
             </a:r>
             <a:endParaRPr lang="en-US" dirty="0"/>
           </a:p>
@@ -1795,7 +2002,7 @@
     </p:spTree>
     <p:extLst>
       <p:ext uri="{BB962C8B-B14F-4D97-AF65-F5344CB8AC3E}">
-        <p14:creationId xmlns:p14="http://schemas.microsoft.com/office/powerpoint/2010/main" val="681828960"/>
+        <p14:creationId xmlns:p14="http://schemas.microsoft.com/office/powerpoint/2010/main" val="874158331"/>
       </p:ext>
     </p:extLst>
   </p:cSld>
@@ -2252,7 +2459,7 @@
           <a:p>
             <a:fld id="{564CF2E0-CCC4-4E1E-9902-C3C36AB3FDA4}" type="datetimeFigureOut">
               <a:rPr lang="en-US" smtClean="0"/>
-              <a:t>9/27/14</a:t>
+              <a:t>9/28/14</a:t>
             </a:fld>
             <a:endParaRPr lang="en-US"/>
           </a:p>
@@ -2435,7 +2642,7 @@
           <a:p>
             <a:fld id="{564CF2E0-CCC4-4E1E-9902-C3C36AB3FDA4}" type="datetimeFigureOut">
               <a:rPr lang="en-US" smtClean="0"/>
-              <a:t>9/27/14</a:t>
+              <a:t>9/28/14</a:t>
             </a:fld>
             <a:endParaRPr lang="en-US"/>
           </a:p>
@@ -2615,7 +2822,7 @@
           <a:p>
             <a:fld id="{564CF2E0-CCC4-4E1E-9902-C3C36AB3FDA4}" type="datetimeFigureOut">
               <a:rPr lang="en-US" smtClean="0"/>
-              <a:t>9/27/14</a:t>
+              <a:t>9/28/14</a:t>
             </a:fld>
             <a:endParaRPr lang="en-US" dirty="0"/>
           </a:p>
@@ -2909,7 +3116,7 @@
           <a:p>
             <a:fld id="{564CF2E0-CCC4-4E1E-9902-C3C36AB3FDA4}" type="datetimeFigureOut">
               <a:rPr lang="en-US" smtClean="0"/>
-              <a:t>9/27/14</a:t>
+              <a:t>9/28/14</a:t>
             </a:fld>
             <a:endParaRPr lang="en-US"/>
           </a:p>
@@ -3245,7 +3452,7 @@
           <a:p>
             <a:fld id="{564CF2E0-CCC4-4E1E-9902-C3C36AB3FDA4}" type="datetimeFigureOut">
               <a:rPr lang="en-US" smtClean="0"/>
-              <a:t>9/27/14</a:t>
+              <a:t>9/28/14</a:t>
             </a:fld>
             <a:endParaRPr lang="en-US"/>
           </a:p>
@@ -3678,7 +3885,7 @@
           <a:p>
             <a:fld id="{564CF2E0-CCC4-4E1E-9902-C3C36AB3FDA4}" type="datetimeFigureOut">
               <a:rPr lang="en-US" smtClean="0"/>
-              <a:t>9/27/14</a:t>
+              <a:t>9/28/14</a:t>
             </a:fld>
             <a:endParaRPr lang="en-US"/>
           </a:p>
@@ -3869,7 +4076,7 @@
           <a:p>
             <a:fld id="{564CF2E0-CCC4-4E1E-9902-C3C36AB3FDA4}" type="datetimeFigureOut">
               <a:rPr lang="en-US" smtClean="0"/>
-              <a:t>9/27/14</a:t>
+              <a:t>9/28/14</a:t>
             </a:fld>
             <a:endParaRPr lang="en-US"/>
           </a:p>
@@ -3967,7 +4174,7 @@
           <a:p>
             <a:fld id="{564CF2E0-CCC4-4E1E-9902-C3C36AB3FDA4}" type="datetimeFigureOut">
               <a:rPr lang="en-US" smtClean="0"/>
-              <a:t>9/27/14</a:t>
+              <a:t>9/28/14</a:t>
             </a:fld>
             <a:endParaRPr lang="en-US"/>
           </a:p>
@@ -4255,7 +4462,7 @@
           <a:p>
             <a:fld id="{564CF2E0-CCC4-4E1E-9902-C3C36AB3FDA4}" type="datetimeFigureOut">
               <a:rPr lang="en-US" smtClean="0"/>
-              <a:t>9/27/14</a:t>
+              <a:t>9/28/14</a:t>
             </a:fld>
             <a:endParaRPr lang="en-US"/>
           </a:p>
@@ -4562,7 +4769,7 @@
           <a:p>
             <a:fld id="{564CF2E0-CCC4-4E1E-9902-C3C36AB3FDA4}" type="datetimeFigureOut">
               <a:rPr lang="en-US" smtClean="0"/>
-              <a:t>9/27/14</a:t>
+              <a:t>9/28/14</a:t>
             </a:fld>
             <a:endParaRPr lang="en-US"/>
           </a:p>
@@ -5573,7 +5780,7 @@
         </p:spPr>
         <p:txBody>
           <a:bodyPr>
-            <a:normAutofit lnSpcReduction="10000"/>
+            <a:normAutofit/>
           </a:bodyPr>
           <a:lstStyle/>
           <a:p>
@@ -5600,27 +5807,11 @@
             </a:pPr>
             <a:r>
               <a:rPr lang="en-US" sz="3000" dirty="0" smtClean="0"/>
-              <a:t>Slows down the process</a:t>
-            </a:r>
-            <a:endParaRPr lang="en-US" sz="2600" dirty="0" smtClean="0"/>
-          </a:p>
-          <a:p>
-            <a:pPr>
-              <a:spcBef>
-                <a:spcPct val="60000"/>
-              </a:spcBef>
-            </a:pPr>
-            <a:r>
-              <a:rPr lang="en-US" sz="2800" dirty="0" smtClean="0"/>
-              <a:t>Ops copies </a:t>
-            </a:r>
-            <a:r>
-              <a:rPr lang="en-US" sz="2800" dirty="0" err="1" smtClean="0"/>
-              <a:t>warfile</a:t>
-            </a:r>
-            <a:r>
-              <a:rPr lang="en-US" sz="2800" dirty="0" smtClean="0"/>
-              <a:t> to server</a:t>
+              <a:t>Slows down the </a:t>
+            </a:r>
+            <a:r>
+              <a:rPr lang="en-US" sz="3000" dirty="0" smtClean="0"/>
+              <a:t>process</a:t>
             </a:r>
           </a:p>
           <a:p>
@@ -5630,21 +5821,10 @@
               </a:spcBef>
             </a:pPr>
             <a:r>
-              <a:rPr lang="en-US" sz="2600" dirty="0" smtClean="0"/>
-              <a:t>Ops don’t use Windows - PITA getting the file</a:t>
-            </a:r>
-          </a:p>
-          <a:p>
-            <a:pPr lvl="1">
-              <a:spcBef>
-                <a:spcPct val="60000"/>
-              </a:spcBef>
-            </a:pPr>
-            <a:r>
-              <a:rPr lang="en-US" sz="2600" dirty="0" smtClean="0"/>
-              <a:t>Fragile process, must get the correct file and deploy to the correct server and location</a:t>
-            </a:r>
-            <a:endParaRPr lang="en-US" sz="2600" dirty="0"/>
+              <a:rPr lang="en-US" sz="3000" dirty="0" smtClean="0"/>
+              <a:t>Kind of feels like this…</a:t>
+            </a:r>
+            <a:endParaRPr lang="en-US" sz="2600" dirty="0" smtClean="0"/>
           </a:p>
         </p:txBody>
       </p:sp>
@@ -5781,6 +5961,153 @@
                   <a:srgbClr val="0062AC"/>
                 </a:solidFill>
               </a:rPr>
+              <a:t>Pre-Jenkins Issues</a:t>
+            </a:r>
+            <a:endParaRPr lang="en-US" dirty="0">
+              <a:solidFill>
+                <a:srgbClr val="0062AC"/>
+              </a:solidFill>
+            </a:endParaRPr>
+          </a:p>
+        </p:txBody>
+      </p:sp>
+      <p:sp>
+        <p:nvSpPr>
+          <p:cNvPr id="201731" name="Rectangle 3"/>
+          <p:cNvSpPr>
+            <a:spLocks noGrp="1" noChangeAspect="1" noChangeArrowheads="1"/>
+          </p:cNvSpPr>
+          <p:nvPr>
+            <p:ph idx="1"/>
+          </p:nvPr>
+        </p:nvSpPr>
+        <p:spPr>
+          <a:xfrm>
+            <a:off x="762000" y="2286000"/>
+            <a:ext cx="7772400" cy="3581400"/>
+          </a:xfrm>
+        </p:spPr>
+        <p:txBody>
+          <a:bodyPr>
+            <a:normAutofit/>
+          </a:bodyPr>
+          <a:lstStyle/>
+          <a:p>
+            <a:pPr>
+              <a:spcBef>
+                <a:spcPct val="60000"/>
+              </a:spcBef>
+            </a:pPr>
+            <a:r>
+              <a:rPr lang="en-US" sz="2800" dirty="0" smtClean="0"/>
+              <a:t>Ops </a:t>
+            </a:r>
+            <a:r>
+              <a:rPr lang="en-US" sz="2800" dirty="0" smtClean="0"/>
+              <a:t>copies </a:t>
+            </a:r>
+            <a:r>
+              <a:rPr lang="en-US" sz="2800" dirty="0" err="1" smtClean="0"/>
+              <a:t>warfile</a:t>
+            </a:r>
+            <a:r>
+              <a:rPr lang="en-US" sz="2800" dirty="0" smtClean="0"/>
+              <a:t> to server</a:t>
+            </a:r>
+          </a:p>
+          <a:p>
+            <a:pPr lvl="1">
+              <a:spcBef>
+                <a:spcPct val="60000"/>
+              </a:spcBef>
+            </a:pPr>
+            <a:r>
+              <a:rPr lang="en-US" sz="2600" dirty="0" smtClean="0"/>
+              <a:t>Ops don’t use Windows - PITA getting the file</a:t>
+            </a:r>
+          </a:p>
+          <a:p>
+            <a:pPr lvl="1">
+              <a:spcBef>
+                <a:spcPct val="60000"/>
+              </a:spcBef>
+            </a:pPr>
+            <a:r>
+              <a:rPr lang="en-US" sz="2600" dirty="0" smtClean="0"/>
+              <a:t>Fragile process, must get the correct file and deploy to the correct server and location</a:t>
+            </a:r>
+            <a:endParaRPr lang="en-US" sz="2600" dirty="0"/>
+          </a:p>
+        </p:txBody>
+      </p:sp>
+    </p:spTree>
+    <p:extLst>
+      <p:ext uri="{BB962C8B-B14F-4D97-AF65-F5344CB8AC3E}">
+        <p14:creationId xmlns:p14="http://schemas.microsoft.com/office/powerpoint/2010/main" val="1199292137"/>
+      </p:ext>
+    </p:extLst>
+  </p:cSld>
+  <p:clrMapOvr>
+    <a:masterClrMapping/>
+  </p:clrMapOvr>
+  <p:transition xmlns:p14="http://schemas.microsoft.com/office/powerpoint/2010/main">
+    <p:fade/>
+  </p:transition>
+  <p:timing>
+    <p:tnLst>
+      <p:par>
+        <p:cTn xmlns:p14="http://schemas.microsoft.com/office/powerpoint/2010/main" id="1" dur="indefinite" restart="never" nodeType="tmRoot"/>
+      </p:par>
+    </p:tnLst>
+  </p:timing>
+</p:sld>
+</file>
+
+<file path=ppt/slides/slide13.xml><?xml version="1.0" encoding="utf-8"?>
+<p:sld xmlns:a="http://schemas.openxmlformats.org/drawingml/2006/main" xmlns:r="http://schemas.openxmlformats.org/officeDocument/2006/relationships" xmlns:p="http://schemas.openxmlformats.org/presentationml/2006/main" showMasterPhAnim="0">
+  <p:cSld>
+    <p:spTree>
+      <p:nvGrpSpPr>
+        <p:cNvPr id="1" name=""/>
+        <p:cNvGrpSpPr/>
+        <p:nvPr/>
+      </p:nvGrpSpPr>
+      <p:grpSpPr>
+        <a:xfrm>
+          <a:off x="0" y="0"/>
+          <a:ext cx="0" cy="0"/>
+          <a:chOff x="0" y="0"/>
+          <a:chExt cx="0" cy="0"/>
+        </a:xfrm>
+      </p:grpSpPr>
+      <p:sp>
+        <p:nvSpPr>
+          <p:cNvPr id="201730" name="Rectangle 2"/>
+          <p:cNvSpPr>
+            <a:spLocks noGrp="1" noChangeArrowheads="1"/>
+          </p:cNvSpPr>
+          <p:nvPr>
+            <p:ph type="title"/>
+          </p:nvPr>
+        </p:nvSpPr>
+        <p:spPr>
+          <a:xfrm>
+            <a:off x="457200" y="1295400"/>
+            <a:ext cx="8229600" cy="780288"/>
+          </a:xfrm>
+        </p:spPr>
+        <p:txBody>
+          <a:bodyPr>
+            <a:normAutofit fontScale="90000"/>
+          </a:bodyPr>
+          <a:lstStyle/>
+          <a:p>
+            <a:r>
+              <a:rPr lang="en-US" dirty="0" smtClean="0">
+                <a:solidFill>
+                  <a:srgbClr val="0062AC"/>
+                </a:solidFill>
+              </a:rPr>
               <a:t>What is Jenkins?</a:t>
             </a:r>
             <a:endParaRPr lang="en-US" dirty="0">
@@ -5939,7 +6266,7 @@
 </p:sld>
 </file>
 
-<file path=ppt/slides/slide13.xml><?xml version="1.0" encoding="utf-8"?>
+<file path=ppt/slides/slide14.xml><?xml version="1.0" encoding="utf-8"?>
 <p:sld xmlns:a="http://schemas.openxmlformats.org/drawingml/2006/main" xmlns:r="http://schemas.openxmlformats.org/officeDocument/2006/relationships" xmlns:p="http://schemas.openxmlformats.org/presentationml/2006/main" showMasterPhAnim="0">
   <p:cSld>
     <p:spTree>
@@ -6004,191 +6331,6 @@
 </p:sld>
 </file>
 
-<file path=ppt/slides/slide14.xml><?xml version="1.0" encoding="utf-8"?>
-<p:sld xmlns:a="http://schemas.openxmlformats.org/drawingml/2006/main" xmlns:r="http://schemas.openxmlformats.org/officeDocument/2006/relationships" xmlns:p="http://schemas.openxmlformats.org/presentationml/2006/main" showMasterPhAnim="0">
-  <p:cSld>
-    <p:spTree>
-      <p:nvGrpSpPr>
-        <p:cNvPr id="1" name=""/>
-        <p:cNvGrpSpPr/>
-        <p:nvPr/>
-      </p:nvGrpSpPr>
-      <p:grpSpPr>
-        <a:xfrm>
-          <a:off x="0" y="0"/>
-          <a:ext cx="0" cy="0"/>
-          <a:chOff x="0" y="0"/>
-          <a:chExt cx="0" cy="0"/>
-        </a:xfrm>
-      </p:grpSpPr>
-      <p:sp>
-        <p:nvSpPr>
-          <p:cNvPr id="201730" name="Rectangle 2"/>
-          <p:cNvSpPr>
-            <a:spLocks noGrp="1" noChangeArrowheads="1"/>
-          </p:cNvSpPr>
-          <p:nvPr>
-            <p:ph type="title"/>
-          </p:nvPr>
-        </p:nvSpPr>
-        <p:spPr>
-          <a:xfrm>
-            <a:off x="457200" y="1295400"/>
-            <a:ext cx="8229600" cy="780288"/>
-          </a:xfrm>
-        </p:spPr>
-        <p:txBody>
-          <a:bodyPr>
-            <a:normAutofit fontScale="90000"/>
-          </a:bodyPr>
-          <a:lstStyle/>
-          <a:p>
-            <a:r>
-              <a:rPr lang="en-US" dirty="0" smtClean="0">
-                <a:solidFill>
-                  <a:srgbClr val="0062AC"/>
-                </a:solidFill>
-              </a:rPr>
-              <a:t>What we use Jenkins for</a:t>
-            </a:r>
-            <a:endParaRPr lang="en-US" dirty="0">
-              <a:solidFill>
-                <a:srgbClr val="0062AC"/>
-              </a:solidFill>
-            </a:endParaRPr>
-          </a:p>
-        </p:txBody>
-      </p:sp>
-      <p:sp>
-        <p:nvSpPr>
-          <p:cNvPr id="201731" name="Rectangle 3"/>
-          <p:cNvSpPr>
-            <a:spLocks noGrp="1" noChangeAspect="1" noChangeArrowheads="1"/>
-          </p:cNvSpPr>
-          <p:nvPr>
-            <p:ph idx="1"/>
-          </p:nvPr>
-        </p:nvSpPr>
-        <p:spPr>
-          <a:xfrm>
-            <a:off x="762000" y="2286000"/>
-            <a:ext cx="7772400" cy="3581400"/>
-          </a:xfrm>
-        </p:spPr>
-        <p:txBody>
-          <a:bodyPr>
-            <a:normAutofit fontScale="92500" lnSpcReduction="10000"/>
-          </a:bodyPr>
-          <a:lstStyle/>
-          <a:p>
-            <a:pPr marL="0" indent="0">
-              <a:spcBef>
-                <a:spcPct val="60000"/>
-              </a:spcBef>
-              <a:buNone/>
-            </a:pPr>
-            <a:r>
-              <a:rPr lang="en-US" sz="2800" dirty="0" smtClean="0"/>
-              <a:t>Ops had been using it for:</a:t>
-            </a:r>
-            <a:endParaRPr lang="en-US" sz="2800" dirty="0"/>
-          </a:p>
-          <a:p>
-            <a:pPr lvl="1">
-              <a:spcBef>
-                <a:spcPct val="60000"/>
-              </a:spcBef>
-            </a:pPr>
-            <a:r>
-              <a:rPr lang="en-US" sz="3000" dirty="0" smtClean="0"/>
-              <a:t>CAS - built &amp; half-deployed</a:t>
-            </a:r>
-          </a:p>
-          <a:p>
-            <a:pPr lvl="1">
-              <a:spcBef>
-                <a:spcPct val="60000"/>
-              </a:spcBef>
-            </a:pPr>
-            <a:r>
-              <a:rPr lang="en-US" sz="3000" dirty="0" smtClean="0"/>
-              <a:t>Puppet manifest – tested and deployed</a:t>
-            </a:r>
-          </a:p>
-          <a:p>
-            <a:pPr lvl="1">
-              <a:spcBef>
-                <a:spcPct val="60000"/>
-              </a:spcBef>
-            </a:pPr>
-            <a:r>
-              <a:rPr lang="en-US" sz="3000" dirty="0" err="1" smtClean="0"/>
-              <a:t>Sympa</a:t>
-            </a:r>
-            <a:r>
-              <a:rPr lang="en-US" sz="3000" dirty="0" smtClean="0"/>
-              <a:t> Source - built, and,</a:t>
-            </a:r>
-            <a:r>
-              <a:rPr lang="en-US" sz="3000" dirty="0"/>
-              <a:t> </a:t>
-            </a:r>
-            <a:r>
-              <a:rPr lang="en-US" sz="3000" dirty="0" smtClean="0"/>
-              <a:t>half-deployed</a:t>
-            </a:r>
-          </a:p>
-          <a:p>
-            <a:pPr>
-              <a:spcBef>
-                <a:spcPct val="60000"/>
-              </a:spcBef>
-            </a:pPr>
-            <a:r>
-              <a:rPr lang="en-US" sz="2800" dirty="0" err="1" smtClean="0"/>
-              <a:t>Devs</a:t>
-            </a:r>
-            <a:r>
-              <a:rPr lang="en-US" sz="2800" dirty="0" smtClean="0"/>
-              <a:t> are building 4 Grails Apps</a:t>
-            </a:r>
-          </a:p>
-          <a:p>
-            <a:pPr>
-              <a:spcBef>
-                <a:spcPct val="60000"/>
-              </a:spcBef>
-            </a:pPr>
-            <a:r>
-              <a:rPr lang="en-US" sz="2800" dirty="0" smtClean="0"/>
-              <a:t>Plan on using it to build &amp; deploy XE Apps</a:t>
-            </a:r>
-          </a:p>
-        </p:txBody>
-      </p:sp>
-    </p:spTree>
-    <p:extLst>
-      <p:ext uri="{BB962C8B-B14F-4D97-AF65-F5344CB8AC3E}">
-        <p14:creationId xmlns:p14="http://schemas.microsoft.com/office/powerpoint/2010/main" val="2623853002"/>
-      </p:ext>
-    </p:extLst>
-  </p:cSld>
-  <p:clrMapOvr>
-    <a:masterClrMapping/>
-  </p:clrMapOvr>
-  <p:transition xmlns:p14="http://schemas.microsoft.com/office/powerpoint/2010/main">
-    <p:fade/>
-  </p:transition>
-  <p:timing>
-    <p:tnLst>
-      <p:par>
-        <p:cTn xmlns:p14="http://schemas.microsoft.com/office/powerpoint/2010/main" id="1" dur="indefinite" restart="never" nodeType="tmRoot"/>
-      </p:par>
-    </p:tnLst>
-  </p:timing>
-</p:sld>
-</file>
-
 <file path=ppt/slides/slide15.xml><?xml version="1.0" encoding="utf-8"?>
 <p:sld xmlns:a="http://schemas.openxmlformats.org/drawingml/2006/main" xmlns:r="http://schemas.openxmlformats.org/officeDocument/2006/relationships" xmlns:p="http://schemas.openxmlformats.org/presentationml/2006/main" showMasterPhAnim="0">
   <p:cSld>
@@ -6208,7 +6350,7 @@
       </p:grpSpPr>
       <p:sp>
         <p:nvSpPr>
-          <p:cNvPr id="207874" name="Rectangle 2"/>
+          <p:cNvPr id="201730" name="Rectangle 2"/>
           <p:cNvSpPr>
             <a:spLocks noGrp="1" noChangeArrowheads="1"/>
           </p:cNvSpPr>
@@ -6218,13 +6360,13 @@
         </p:nvSpPr>
         <p:spPr>
           <a:xfrm>
-            <a:off x="381000" y="1371600"/>
-            <a:ext cx="8229600" cy="1066800"/>
+            <a:off x="457200" y="1295400"/>
+            <a:ext cx="8229600" cy="780288"/>
           </a:xfrm>
         </p:spPr>
         <p:txBody>
           <a:bodyPr>
-            <a:normAutofit/>
+            <a:normAutofit fontScale="90000"/>
           </a:bodyPr>
           <a:lstStyle/>
           <a:p>
@@ -6234,7 +6376,7 @@
                   <a:srgbClr val="0062AC"/>
                 </a:solidFill>
               </a:rPr>
-              <a:t>Post Jenkins</a:t>
+              <a:t>What we use Jenkins for</a:t>
             </a:r>
             <a:endParaRPr lang="en-US" dirty="0">
               <a:solidFill>
@@ -6246,7 +6388,7 @@
       </p:sp>
       <p:sp>
         <p:nvSpPr>
-          <p:cNvPr id="207875" name="Rectangle 3"/>
+          <p:cNvPr id="201731" name="Rectangle 3"/>
           <p:cNvSpPr>
             <a:spLocks noGrp="1" noChangeAspect="1" noChangeArrowheads="1"/>
           </p:cNvSpPr>
@@ -6256,15 +6398,73 @@
         </p:nvSpPr>
         <p:spPr>
           <a:xfrm>
-            <a:off x="914400" y="2590800"/>
-            <a:ext cx="7772400" cy="3200400"/>
+            <a:off x="762000" y="2286000"/>
+            <a:ext cx="7772400" cy="3581400"/>
           </a:xfrm>
         </p:spPr>
         <p:txBody>
           <a:bodyPr>
-            <a:normAutofit lnSpcReduction="10000"/>
+            <a:normAutofit fontScale="92500" lnSpcReduction="10000"/>
           </a:bodyPr>
           <a:lstStyle/>
+          <a:p>
+            <a:pPr marL="0" indent="0">
+              <a:spcBef>
+                <a:spcPct val="60000"/>
+              </a:spcBef>
+              <a:buNone/>
+            </a:pPr>
+            <a:r>
+              <a:rPr lang="en-US" sz="2800" dirty="0" smtClean="0"/>
+              <a:t>Ops had been using it for:</a:t>
+            </a:r>
+            <a:endParaRPr lang="en-US" sz="2800" dirty="0"/>
+          </a:p>
+          <a:p>
+            <a:pPr lvl="1">
+              <a:spcBef>
+                <a:spcPct val="60000"/>
+              </a:spcBef>
+            </a:pPr>
+            <a:r>
+              <a:rPr lang="en-US" sz="3000" dirty="0" smtClean="0"/>
+              <a:t>CAS - built &amp; half-deployed</a:t>
+            </a:r>
+          </a:p>
+          <a:p>
+            <a:pPr lvl="1">
+              <a:spcBef>
+                <a:spcPct val="60000"/>
+              </a:spcBef>
+            </a:pPr>
+            <a:r>
+              <a:rPr lang="en-US" sz="3000" dirty="0" smtClean="0"/>
+              <a:t>Puppet manifest – tested and deployed</a:t>
+            </a:r>
+          </a:p>
+          <a:p>
+            <a:pPr lvl="1">
+              <a:spcBef>
+                <a:spcPct val="60000"/>
+              </a:spcBef>
+            </a:pPr>
+            <a:r>
+              <a:rPr lang="en-US" sz="3000" dirty="0" err="1" smtClean="0"/>
+              <a:t>Sympa</a:t>
+            </a:r>
+            <a:r>
+              <a:rPr lang="en-US" sz="3000" dirty="0" smtClean="0"/>
+              <a:t> Source - built, and,</a:t>
+            </a:r>
+            <a:r>
+              <a:rPr lang="en-US" sz="3000" dirty="0"/>
+              <a:t> </a:t>
+            </a:r>
+            <a:r>
+              <a:rPr lang="en-US" sz="3000" dirty="0" smtClean="0"/>
+              <a:t>half-deployed</a:t>
+            </a:r>
+          </a:p>
           <a:p>
             <a:pPr>
               <a:spcBef>
@@ -6273,17 +6473,12 @@
             </a:pPr>
             <a:r>
               <a:rPr lang="en-US" sz="2800" dirty="0" err="1" smtClean="0"/>
-              <a:t>Dev</a:t>
+              <a:t>Devs</a:t>
             </a:r>
             <a:r>
               <a:rPr lang="en-US" sz="2800" dirty="0" smtClean="0"/>
-              <a:t> pushes code to </a:t>
-            </a:r>
-            <a:r>
-              <a:rPr lang="en-US" sz="2800" dirty="0" err="1" smtClean="0"/>
-              <a:t>git</a:t>
-            </a:r>
-            <a:endParaRPr lang="en-US" sz="2800" dirty="0" smtClean="0"/>
+              <a:t> are building 4 Grails Apps</a:t>
+            </a:r>
           </a:p>
           <a:p>
             <a:pPr>
@@ -6292,72 +6487,18 @@
               </a:spcBef>
             </a:pPr>
             <a:r>
-              <a:rPr lang="en-US" sz="2800" dirty="0" err="1" smtClean="0"/>
-              <a:t>Git</a:t>
-            </a:r>
-            <a:r>
               <a:rPr lang="en-US" sz="2800" dirty="0" smtClean="0"/>
-              <a:t> pings Jenkins it has something for it</a:t>
-            </a:r>
-          </a:p>
-          <a:p>
-            <a:pPr>
-              <a:spcBef>
-                <a:spcPct val="60000"/>
-              </a:spcBef>
-            </a:pPr>
-            <a:r>
-              <a:rPr lang="en-US" sz="2800" dirty="0" smtClean="0"/>
-              <a:t>Jenkins </a:t>
-            </a:r>
-            <a:r>
-              <a:rPr lang="en-US" sz="2800" dirty="0" err="1" smtClean="0"/>
-              <a:t>git’s</a:t>
-            </a:r>
-            <a:r>
-              <a:rPr lang="en-US" sz="2800" dirty="0" smtClean="0"/>
-              <a:t> the updated code</a:t>
-            </a:r>
-          </a:p>
-          <a:p>
-            <a:pPr>
-              <a:spcBef>
-                <a:spcPct val="60000"/>
-              </a:spcBef>
-            </a:pPr>
-            <a:r>
-              <a:rPr lang="en-US" sz="2800" dirty="0" smtClean="0"/>
-              <a:t>Jenkins builds a </a:t>
-            </a:r>
-            <a:r>
-              <a:rPr lang="en-US" sz="2800" dirty="0" err="1" smtClean="0"/>
-              <a:t>warfile</a:t>
-            </a:r>
-            <a:endParaRPr lang="en-US" sz="2800" dirty="0" smtClean="0"/>
-          </a:p>
-          <a:p>
-            <a:pPr>
-              <a:spcBef>
-                <a:spcPct val="60000"/>
-              </a:spcBef>
-            </a:pPr>
-            <a:r>
-              <a:rPr lang="en-US" sz="2800" dirty="0" smtClean="0"/>
-              <a:t>Jenkins “deploys” the </a:t>
-            </a:r>
-            <a:r>
-              <a:rPr lang="en-US" sz="2800" dirty="0" err="1" smtClean="0"/>
-              <a:t>warfile</a:t>
-            </a:r>
-            <a:r>
-              <a:rPr lang="en-US" sz="2800" dirty="0" smtClean="0"/>
-              <a:t> to Tomcat</a:t>
-            </a:r>
-            <a:endParaRPr lang="en-US" sz="2800" dirty="0"/>
+              <a:t>Plan on using it to build &amp; deploy XE Apps</a:t>
+            </a:r>
           </a:p>
         </p:txBody>
       </p:sp>
     </p:spTree>
+    <p:extLst>
+      <p:ext uri="{BB962C8B-B14F-4D97-AF65-F5344CB8AC3E}">
+        <p14:creationId xmlns:p14="http://schemas.microsoft.com/office/powerpoint/2010/main" val="2623853002"/>
+      </p:ext>
+    </p:extLst>
   </p:cSld>
   <p:clrMapOvr>
     <a:masterClrMapping/>
@@ -6394,7 +6535,7 @@
       </p:grpSpPr>
       <p:sp>
         <p:nvSpPr>
-          <p:cNvPr id="208898" name="Rectangle 2"/>
+          <p:cNvPr id="207874" name="Rectangle 2"/>
           <p:cNvSpPr>
             <a:spLocks noGrp="1" noChangeArrowheads="1"/>
           </p:cNvSpPr>
@@ -6405,12 +6546,12 @@
         <p:spPr>
           <a:xfrm>
             <a:off x="381000" y="1371600"/>
-            <a:ext cx="8229600" cy="856488"/>
+            <a:ext cx="8229600" cy="1066800"/>
           </a:xfrm>
         </p:spPr>
         <p:txBody>
           <a:bodyPr>
-            <a:normAutofit fontScale="90000"/>
+            <a:normAutofit/>
           </a:bodyPr>
           <a:lstStyle/>
           <a:p>
@@ -6420,7 +6561,7 @@
                   <a:srgbClr val="0062AC"/>
                 </a:solidFill>
               </a:rPr>
-              <a:t>Post-Jenkins Pros</a:t>
+              <a:t>Post Jenkins</a:t>
             </a:r>
             <a:endParaRPr lang="en-US" dirty="0">
               <a:solidFill>
@@ -6432,7 +6573,7 @@
       </p:sp>
       <p:sp>
         <p:nvSpPr>
-          <p:cNvPr id="208899" name="Rectangle 3"/>
+          <p:cNvPr id="207875" name="Rectangle 3"/>
           <p:cNvSpPr>
             <a:spLocks noGrp="1" noChangeAspect="1" noChangeArrowheads="1"/>
           </p:cNvSpPr>
@@ -6442,73 +6583,102 @@
         </p:nvSpPr>
         <p:spPr>
           <a:xfrm>
-            <a:off x="914400" y="2438400"/>
-            <a:ext cx="7772400" cy="3581400"/>
+            <a:off x="914400" y="2590800"/>
+            <a:ext cx="7772400" cy="3200400"/>
           </a:xfrm>
         </p:spPr>
         <p:txBody>
           <a:bodyPr>
-            <a:normAutofit/>
+            <a:normAutofit lnSpcReduction="10000"/>
           </a:bodyPr>
           <a:lstStyle/>
           <a:p>
+            <a:pPr>
+              <a:spcBef>
+                <a:spcPct val="60000"/>
+              </a:spcBef>
+            </a:pPr>
+            <a:r>
+              <a:rPr lang="en-US" sz="2800" dirty="0" err="1" smtClean="0"/>
+              <a:t>Dev</a:t>
+            </a:r>
             <a:r>
               <a:rPr lang="en-US" sz="2800" dirty="0" smtClean="0"/>
-              <a:t>Jenkins server runs the same:</a:t>
-            </a:r>
-          </a:p>
-          <a:p>
-            <a:pPr lvl="1"/>
-            <a:r>
-              <a:rPr lang="en-US" sz="2600" dirty="0" smtClean="0"/>
-              <a:t>OS – built on the same image as the Tomcat servers</a:t>
-            </a:r>
-          </a:p>
-          <a:p>
-            <a:pPr lvl="1"/>
-            <a:r>
-              <a:rPr lang="en-US" sz="2600" dirty="0" smtClean="0"/>
-              <a:t>Same Java</a:t>
-            </a:r>
-          </a:p>
-          <a:p>
-            <a:pPr lvl="1"/>
-            <a:r>
-              <a:rPr lang="en-US" sz="2600" dirty="0" smtClean="0"/>
-              <a:t>Same Tomcat</a:t>
-            </a:r>
-            <a:endParaRPr lang="en-US" sz="2600" dirty="0"/>
-          </a:p>
-          <a:p>
-            <a:r>
-              <a:rPr lang="en-US" sz="2800" dirty="0" err="1" smtClean="0"/>
-              <a:t>Warfile</a:t>
-            </a:r>
-            <a:r>
-              <a:rPr lang="en-US" sz="2800" dirty="0" smtClean="0"/>
-              <a:t> is built automatically at </a:t>
+              <a:t> pushes code to </a:t>
             </a:r>
             <a:r>
               <a:rPr lang="en-US" sz="2800" dirty="0" err="1" smtClean="0"/>
               <a:t>git</a:t>
             </a:r>
+            <a:endParaRPr lang="en-US" sz="2800" dirty="0" smtClean="0"/>
+          </a:p>
+          <a:p>
+            <a:pPr>
+              <a:spcBef>
+                <a:spcPct val="60000"/>
+              </a:spcBef>
+            </a:pPr>
+            <a:r>
+              <a:rPr lang="en-US" sz="2800" dirty="0" err="1" smtClean="0"/>
+              <a:t>Git</a:t>
+            </a:r>
             <a:r>
               <a:rPr lang="en-US" sz="2800" dirty="0" smtClean="0"/>
-              <a:t> check-in</a:t>
-            </a:r>
-          </a:p>
-          <a:p>
+              <a:t> pings Jenkins it has something for it</a:t>
+            </a:r>
+          </a:p>
+          <a:p>
+            <a:pPr>
+              <a:spcBef>
+                <a:spcPct val="60000"/>
+              </a:spcBef>
+            </a:pPr>
             <a:r>
               <a:rPr lang="en-US" sz="2800" dirty="0" smtClean="0"/>
-              <a:t>Jenkins deploys the correct </a:t>
+              <a:t>Jenkins </a:t>
+            </a:r>
+            <a:r>
+              <a:rPr lang="en-US" sz="2800" dirty="0" err="1" smtClean="0"/>
+              <a:t>git’s</a:t>
+            </a:r>
+            <a:r>
+              <a:rPr lang="en-US" sz="2800" dirty="0" smtClean="0"/>
+              <a:t> the updated code</a:t>
+            </a:r>
+          </a:p>
+          <a:p>
+            <a:pPr>
+              <a:spcBef>
+                <a:spcPct val="60000"/>
+              </a:spcBef>
+            </a:pPr>
+            <a:r>
+              <a:rPr lang="en-US" sz="2800" dirty="0" smtClean="0"/>
+              <a:t>Jenkins builds a </a:t>
             </a:r>
             <a:r>
               <a:rPr lang="en-US" sz="2800" dirty="0" err="1" smtClean="0"/>
               <a:t>warfile</a:t>
             </a:r>
+            <a:endParaRPr lang="en-US" sz="2800" dirty="0" smtClean="0"/>
+          </a:p>
+          <a:p>
+            <a:pPr>
+              <a:spcBef>
+                <a:spcPct val="60000"/>
+              </a:spcBef>
+            </a:pPr>
             <a:r>
               <a:rPr lang="en-US" sz="2800" dirty="0" smtClean="0"/>
-              <a:t> to the correct server</a:t>
+              <a:t>Jenkins “deploys” the </a:t>
+            </a:r>
+            <a:r>
+              <a:rPr lang="en-US" sz="2800" dirty="0" err="1" smtClean="0"/>
+              <a:t>warfile</a:t>
+            </a:r>
+            <a:r>
+              <a:rPr lang="en-US" sz="2800" dirty="0" smtClean="0"/>
+              <a:t> to Tomcat</a:t>
             </a:r>
             <a:endParaRPr lang="en-US" sz="2800" dirty="0"/>
           </a:p>
@@ -6577,6 +6747,163 @@
                   <a:srgbClr val="0062AC"/>
                 </a:solidFill>
               </a:rPr>
+              <a:t>Post-Jenkins Pros</a:t>
+            </a:r>
+            <a:endParaRPr lang="en-US" dirty="0">
+              <a:solidFill>
+                <a:srgbClr val="0062AC"/>
+              </a:solidFill>
+            </a:endParaRPr>
+          </a:p>
+        </p:txBody>
+      </p:sp>
+      <p:sp>
+        <p:nvSpPr>
+          <p:cNvPr id="208899" name="Rectangle 3"/>
+          <p:cNvSpPr>
+            <a:spLocks noGrp="1" noChangeAspect="1" noChangeArrowheads="1"/>
+          </p:cNvSpPr>
+          <p:nvPr>
+            <p:ph idx="1"/>
+          </p:nvPr>
+        </p:nvSpPr>
+        <p:spPr>
+          <a:xfrm>
+            <a:off x="914400" y="2438400"/>
+            <a:ext cx="7772400" cy="3581400"/>
+          </a:xfrm>
+        </p:spPr>
+        <p:txBody>
+          <a:bodyPr>
+            <a:normAutofit/>
+          </a:bodyPr>
+          <a:lstStyle/>
+          <a:p>
+            <a:r>
+              <a:rPr lang="en-US" sz="2800" dirty="0" smtClean="0"/>
+              <a:t>Jenkins server runs the same:</a:t>
+            </a:r>
+          </a:p>
+          <a:p>
+            <a:pPr lvl="1"/>
+            <a:r>
+              <a:rPr lang="en-US" sz="2600" dirty="0" smtClean="0"/>
+              <a:t>OS – built on the same image as the Tomcat servers</a:t>
+            </a:r>
+          </a:p>
+          <a:p>
+            <a:pPr lvl="1"/>
+            <a:r>
+              <a:rPr lang="en-US" sz="2600" dirty="0" smtClean="0"/>
+              <a:t>Same Java</a:t>
+            </a:r>
+          </a:p>
+          <a:p>
+            <a:pPr lvl="1"/>
+            <a:r>
+              <a:rPr lang="en-US" sz="2600" dirty="0" smtClean="0"/>
+              <a:t>Same Tomcat</a:t>
+            </a:r>
+            <a:endParaRPr lang="en-US" sz="2600" dirty="0"/>
+          </a:p>
+          <a:p>
+            <a:r>
+              <a:rPr lang="en-US" sz="2800" dirty="0" err="1" smtClean="0"/>
+              <a:t>Warfile</a:t>
+            </a:r>
+            <a:r>
+              <a:rPr lang="en-US" sz="2800" dirty="0" smtClean="0"/>
+              <a:t> is built automatically at </a:t>
+            </a:r>
+            <a:r>
+              <a:rPr lang="en-US" sz="2800" dirty="0" err="1" smtClean="0"/>
+              <a:t>git</a:t>
+            </a:r>
+            <a:r>
+              <a:rPr lang="en-US" sz="2800" dirty="0" smtClean="0"/>
+              <a:t> check-in</a:t>
+            </a:r>
+          </a:p>
+          <a:p>
+            <a:r>
+              <a:rPr lang="en-US" sz="2800" dirty="0" smtClean="0"/>
+              <a:t>Jenkins deploys the correct </a:t>
+            </a:r>
+            <a:r>
+              <a:rPr lang="en-US" sz="2800" dirty="0" err="1" smtClean="0"/>
+              <a:t>warfile</a:t>
+            </a:r>
+            <a:r>
+              <a:rPr lang="en-US" sz="2800" dirty="0" smtClean="0"/>
+              <a:t> to the correct server</a:t>
+            </a:r>
+            <a:endParaRPr lang="en-US" sz="2800" dirty="0"/>
+          </a:p>
+        </p:txBody>
+      </p:sp>
+    </p:spTree>
+  </p:cSld>
+  <p:clrMapOvr>
+    <a:masterClrMapping/>
+  </p:clrMapOvr>
+  <p:transition xmlns:p14="http://schemas.microsoft.com/office/powerpoint/2010/main">
+    <p:fade/>
+  </p:transition>
+  <p:timing>
+    <p:tnLst>
+      <p:par>
+        <p:cTn xmlns:p14="http://schemas.microsoft.com/office/powerpoint/2010/main" id="1" dur="indefinite" restart="never" nodeType="tmRoot"/>
+      </p:par>
+    </p:tnLst>
+  </p:timing>
+</p:sld>
+</file>
+
+<file path=ppt/slides/slide18.xml><?xml version="1.0" encoding="utf-8"?>
+<p:sld xmlns:a="http://schemas.openxmlformats.org/drawingml/2006/main" xmlns:r="http://schemas.openxmlformats.org/officeDocument/2006/relationships" xmlns:p="http://schemas.openxmlformats.org/presentationml/2006/main" showMasterPhAnim="0">
+  <p:cSld>
+    <p:spTree>
+      <p:nvGrpSpPr>
+        <p:cNvPr id="1" name=""/>
+        <p:cNvGrpSpPr/>
+        <p:nvPr/>
+      </p:nvGrpSpPr>
+      <p:grpSpPr>
+        <a:xfrm>
+          <a:off x="0" y="0"/>
+          <a:ext cx="0" cy="0"/>
+          <a:chOff x="0" y="0"/>
+          <a:chExt cx="0" cy="0"/>
+        </a:xfrm>
+      </p:grpSpPr>
+      <p:sp>
+        <p:nvSpPr>
+          <p:cNvPr id="208898" name="Rectangle 2"/>
+          <p:cNvSpPr>
+            <a:spLocks noGrp="1" noChangeArrowheads="1"/>
+          </p:cNvSpPr>
+          <p:nvPr>
+            <p:ph type="title"/>
+          </p:nvPr>
+        </p:nvSpPr>
+        <p:spPr>
+          <a:xfrm>
+            <a:off x="381000" y="1371600"/>
+            <a:ext cx="8229600" cy="856488"/>
+          </a:xfrm>
+        </p:spPr>
+        <p:txBody>
+          <a:bodyPr>
+            <a:normAutofit fontScale="90000"/>
+          </a:bodyPr>
+          <a:lstStyle/>
+          <a:p>
+            <a:r>
+              <a:rPr lang="en-US" dirty="0" smtClean="0">
+                <a:solidFill>
+                  <a:srgbClr val="0062AC"/>
+                </a:solidFill>
+              </a:rPr>
               <a:t>Demonstration</a:t>
             </a:r>
             <a:endParaRPr lang="en-US" dirty="0">
@@ -6669,7 +6996,7 @@
 </p:sld>
 </file>
 
-<file path=ppt/slides/slide18.xml><?xml version="1.0" encoding="utf-8"?>
+<file path=ppt/slides/slide19.xml><?xml version="1.0" encoding="utf-8"?>
 <p:sld xmlns:a="http://schemas.openxmlformats.org/drawingml/2006/main" xmlns:r="http://schemas.openxmlformats.org/officeDocument/2006/relationships" xmlns:p="http://schemas.openxmlformats.org/presentationml/2006/main">
   <p:cSld>
     <p:spTree>
@@ -6703,7 +7030,7 @@
           <a:p>
             <a:fld id="{564CF2E0-CCC4-4E1E-9902-C3C36AB3FDA4}" type="datetimeFigureOut">
               <a:rPr lang="en-US" smtClean="0"/>
-              <a:t>9/27/14</a:t>
+              <a:t>9/28/14</a:t>
             </a:fld>
             <a:endParaRPr lang="en-US" dirty="0"/>
           </a:p>
@@ -6759,7 +7086,7 @@
 </p:sld>
 </file>
 
-<file path=ppt/slides/slide19.xml><?xml version="1.0" encoding="utf-8"?>
+<file path=ppt/slides/slide2.xml><?xml version="1.0" encoding="utf-8"?>
 <p:sld xmlns:a="http://schemas.openxmlformats.org/drawingml/2006/main" xmlns:r="http://schemas.openxmlformats.org/officeDocument/2006/relationships" xmlns:p="http://schemas.openxmlformats.org/presentationml/2006/main">
   <p:cSld>
     <p:spTree>
@@ -6778,6 +7105,213 @@
       </p:grpSpPr>
       <p:sp>
         <p:nvSpPr>
+          <p:cNvPr id="249858" name="Text Box 2"/>
+          <p:cNvSpPr txBox="1">
+            <a:spLocks noGrp="1" noChangeArrowheads="1"/>
+          </p:cNvSpPr>
+          <p:nvPr>
+            <p:ph type="title"/>
+          </p:nvPr>
+        </p:nvSpPr>
+        <p:spPr>
+          <a:xfrm>
+            <a:off x="304800" y="1219200"/>
+            <a:ext cx="8229600" cy="856488"/>
+          </a:xfrm>
+          <a:noFill/>
+          <a:ln/>
+        </p:spPr>
+        <p:txBody>
+          <a:bodyPr anchor="b">
+            <a:normAutofit fontScale="90000"/>
+          </a:bodyPr>
+          <a:lstStyle/>
+          <a:p>
+            <a:r>
+              <a:rPr lang="en-US" dirty="0">
+                <a:solidFill>
+                  <a:srgbClr val="0062AC"/>
+                </a:solidFill>
+                <a:latin typeface="Helvetica" pitchFamily="34" charset="0"/>
+                <a:cs typeface="Helvetica" pitchFamily="34" charset="0"/>
+              </a:rPr>
+              <a:t>Session Rules of Etiquette</a:t>
+            </a:r>
+          </a:p>
+        </p:txBody>
+      </p:sp>
+      <p:sp>
+        <p:nvSpPr>
+          <p:cNvPr id="249859" name="Text Box 3"/>
+          <p:cNvSpPr txBox="1">
+            <a:spLocks noGrp="1" noChangeArrowheads="1"/>
+          </p:cNvSpPr>
+          <p:nvPr>
+            <p:ph idx="1"/>
+          </p:nvPr>
+        </p:nvSpPr>
+        <p:spPr>
+          <a:xfrm>
+            <a:off x="387350" y="1752599"/>
+            <a:ext cx="8305800" cy="3978275"/>
+          </a:xfrm>
+          <a:noFill/>
+          <a:ln/>
+        </p:spPr>
+        <p:txBody>
+          <a:bodyPr>
+            <a:noAutofit/>
+          </a:bodyPr>
+          <a:lstStyle/>
+          <a:p>
+            <a:pPr>
+              <a:spcBef>
+                <a:spcPct val="60000"/>
+              </a:spcBef>
+            </a:pPr>
+            <a:r>
+              <a:rPr lang="en-US" dirty="0"/>
+              <a:t>Please </a:t>
+            </a:r>
+            <a:r>
+              <a:rPr lang="en-US" dirty="0" smtClean="0"/>
+              <a:t>silence </a:t>
+            </a:r>
+            <a:r>
+              <a:rPr lang="en-US" dirty="0"/>
+              <a:t>your cell </a:t>
+            </a:r>
+            <a:r>
+              <a:rPr lang="en-US" dirty="0" smtClean="0"/>
+              <a:t>phone/pager</a:t>
+            </a:r>
+          </a:p>
+          <a:p>
+            <a:pPr>
+              <a:spcBef>
+                <a:spcPct val="60000"/>
+              </a:spcBef>
+            </a:pPr>
+            <a:r>
+              <a:rPr lang="en-US" dirty="0" smtClean="0"/>
+              <a:t>If </a:t>
+            </a:r>
+            <a:r>
+              <a:rPr lang="en-US" dirty="0"/>
+              <a:t>you must leave the session early, please do so as discreetly as possible</a:t>
+            </a:r>
+          </a:p>
+          <a:p>
+            <a:pPr>
+              <a:spcBef>
+                <a:spcPct val="60000"/>
+              </a:spcBef>
+            </a:pPr>
+            <a:r>
+              <a:rPr lang="en-US" dirty="0"/>
+              <a:t>Please avoid side conversation during the </a:t>
+            </a:r>
+            <a:r>
+              <a:rPr lang="en-US" dirty="0" smtClean="0"/>
+              <a:t>session</a:t>
+            </a:r>
+          </a:p>
+          <a:p>
+            <a:pPr>
+              <a:spcBef>
+                <a:spcPct val="60000"/>
+              </a:spcBef>
+            </a:pPr>
+            <a:r>
+              <a:rPr lang="en-US" dirty="0" smtClean="0"/>
+              <a:t>Please, feel free to ask questions at any time</a:t>
+            </a:r>
+          </a:p>
+        </p:txBody>
+      </p:sp>
+      <p:sp>
+        <p:nvSpPr>
+          <p:cNvPr id="249860" name="Text Box 4"/>
+          <p:cNvSpPr txBox="1">
+            <a:spLocks noChangeArrowheads="1"/>
+          </p:cNvSpPr>
+          <p:nvPr/>
+        </p:nvSpPr>
+        <p:spPr bwMode="auto">
+          <a:xfrm>
+            <a:off x="281873" y="4997450"/>
+            <a:ext cx="8470900" cy="488950"/>
+          </a:xfrm>
+          <a:prstGeom prst="rect">
+            <a:avLst/>
+          </a:prstGeom>
+          <a:noFill/>
+          <a:ln w="9525">
+            <a:noFill/>
+            <a:miter lim="800000"/>
+            <a:headEnd/>
+            <a:tailEnd/>
+          </a:ln>
+          <a:effectLst/>
+        </p:spPr>
+        <p:txBody>
+          <a:bodyPr>
+            <a:spAutoFit/>
+          </a:bodyPr>
+          <a:lstStyle/>
+          <a:p>
+            <a:pPr marL="342900" indent="-342900" algn="ctr" eaLnBrk="1" hangingPunct="1">
+              <a:spcBef>
+                <a:spcPct val="50000"/>
+              </a:spcBef>
+              <a:buSzPct val="70000"/>
+              <a:buFont typeface="Wingdings" pitchFamily="2" charset="2"/>
+              <a:buNone/>
+            </a:pPr>
+            <a:r>
+              <a:rPr lang="en-US" sz="2600" dirty="0">
+                <a:latin typeface="Helvetica" pitchFamily="34" charset="0"/>
+              </a:rPr>
+              <a:t>Thank you for your cooperation!</a:t>
+            </a:r>
+          </a:p>
+        </p:txBody>
+      </p:sp>
+    </p:spTree>
+  </p:cSld>
+  <p:clrMapOvr>
+    <a:masterClrMapping/>
+  </p:clrMapOvr>
+  <p:transition xmlns:p14="http://schemas.microsoft.com/office/powerpoint/2010/main"/>
+  <p:timing>
+    <p:tnLst>
+      <p:par>
+        <p:cTn xmlns:p14="http://schemas.microsoft.com/office/powerpoint/2010/main" id="1" dur="indefinite" restart="never" nodeType="tmRoot"/>
+      </p:par>
+    </p:tnLst>
+  </p:timing>
+</p:sld>
+</file>
+
+<file path=ppt/slides/slide20.xml><?xml version="1.0" encoding="utf-8"?>
+<p:sld xmlns:a="http://schemas.openxmlformats.org/drawingml/2006/main" xmlns:r="http://schemas.openxmlformats.org/officeDocument/2006/relationships" xmlns:p="http://schemas.openxmlformats.org/presentationml/2006/main">
+  <p:cSld>
+    <p:spTree>
+      <p:nvGrpSpPr>
+        <p:cNvPr id="1" name=""/>
+        <p:cNvGrpSpPr/>
+        <p:nvPr/>
+      </p:nvGrpSpPr>
+      <p:grpSpPr>
+        <a:xfrm>
+          <a:off x="0" y="0"/>
+          <a:ext cx="0" cy="0"/>
+          <a:chOff x="0" y="0"/>
+          <a:chExt cx="0" cy="0"/>
+        </a:xfrm>
+      </p:grpSpPr>
+      <p:sp>
+        <p:nvSpPr>
           <p:cNvPr id="4" name="Date Placeholder 3"/>
           <p:cNvSpPr>
             <a:spLocks noGrp="1"/>
@@ -6793,7 +7327,7 @@
           <a:p>
             <a:fld id="{564CF2E0-CCC4-4E1E-9902-C3C36AB3FDA4}" type="datetimeFigureOut">
               <a:rPr lang="en-US" smtClean="0"/>
-              <a:t>9/27/14</a:t>
+              <a:t>9/28/14</a:t>
             </a:fld>
             <a:endParaRPr lang="en-US" dirty="0"/>
           </a:p>
@@ -6849,7 +7383,7 @@
 </p:sld>
 </file>
 
-<file path=ppt/slides/slide2.xml><?xml version="1.0" encoding="utf-8"?>
+<file path=ppt/slides/slide21.xml><?xml version="1.0" encoding="utf-8"?>
 <p:sld xmlns:a="http://schemas.openxmlformats.org/drawingml/2006/main" xmlns:r="http://schemas.openxmlformats.org/officeDocument/2006/relationships" xmlns:p="http://schemas.openxmlformats.org/presentationml/2006/main">
   <p:cSld>
     <p:spTree>
@@ -6868,213 +7402,6 @@
       </p:grpSpPr>
       <p:sp>
         <p:nvSpPr>
-          <p:cNvPr id="249858" name="Text Box 2"/>
-          <p:cNvSpPr txBox="1">
-            <a:spLocks noGrp="1" noChangeArrowheads="1"/>
-          </p:cNvSpPr>
-          <p:nvPr>
-            <p:ph type="title"/>
-          </p:nvPr>
-        </p:nvSpPr>
-        <p:spPr>
-          <a:xfrm>
-            <a:off x="304800" y="1219200"/>
-            <a:ext cx="8229600" cy="856488"/>
-          </a:xfrm>
-          <a:noFill/>
-          <a:ln/>
-        </p:spPr>
-        <p:txBody>
-          <a:bodyPr anchor="b">
-            <a:normAutofit fontScale="90000"/>
-          </a:bodyPr>
-          <a:lstStyle/>
-          <a:p>
-            <a:r>
-              <a:rPr lang="en-US" dirty="0">
-                <a:solidFill>
-                  <a:srgbClr val="0062AC"/>
-                </a:solidFill>
-                <a:latin typeface="Helvetica" pitchFamily="34" charset="0"/>
-                <a:cs typeface="Helvetica" pitchFamily="34" charset="0"/>
-              </a:rPr>
-              <a:t>Session Rules of Etiquette</a:t>
-            </a:r>
-          </a:p>
-        </p:txBody>
-      </p:sp>
-      <p:sp>
-        <p:nvSpPr>
-          <p:cNvPr id="249859" name="Text Box 3"/>
-          <p:cNvSpPr txBox="1">
-            <a:spLocks noGrp="1" noChangeArrowheads="1"/>
-          </p:cNvSpPr>
-          <p:nvPr>
-            <p:ph idx="1"/>
-          </p:nvPr>
-        </p:nvSpPr>
-        <p:spPr>
-          <a:xfrm>
-            <a:off x="387350" y="1752599"/>
-            <a:ext cx="8305800" cy="3978275"/>
-          </a:xfrm>
-          <a:noFill/>
-          <a:ln/>
-        </p:spPr>
-        <p:txBody>
-          <a:bodyPr>
-            <a:noAutofit/>
-          </a:bodyPr>
-          <a:lstStyle/>
-          <a:p>
-            <a:pPr>
-              <a:spcBef>
-                <a:spcPct val="60000"/>
-              </a:spcBef>
-            </a:pPr>
-            <a:r>
-              <a:rPr lang="en-US" dirty="0"/>
-              <a:t>Please </a:t>
-            </a:r>
-            <a:r>
-              <a:rPr lang="en-US" dirty="0" smtClean="0"/>
-              <a:t>silence </a:t>
-            </a:r>
-            <a:r>
-              <a:rPr lang="en-US" dirty="0"/>
-              <a:t>your cell </a:t>
-            </a:r>
-            <a:r>
-              <a:rPr lang="en-US" dirty="0" smtClean="0"/>
-              <a:t>phone/pager</a:t>
-            </a:r>
-          </a:p>
-          <a:p>
-            <a:pPr>
-              <a:spcBef>
-                <a:spcPct val="60000"/>
-              </a:spcBef>
-            </a:pPr>
-            <a:r>
-              <a:rPr lang="en-US" dirty="0" smtClean="0"/>
-              <a:t>If </a:t>
-            </a:r>
-            <a:r>
-              <a:rPr lang="en-US" dirty="0"/>
-              <a:t>you must leave the session early, please do so as discreetly as possible</a:t>
-            </a:r>
-          </a:p>
-          <a:p>
-            <a:pPr>
-              <a:spcBef>
-                <a:spcPct val="60000"/>
-              </a:spcBef>
-            </a:pPr>
-            <a:r>
-              <a:rPr lang="en-US" dirty="0"/>
-              <a:t>Please avoid side conversation during the </a:t>
-            </a:r>
-            <a:r>
-              <a:rPr lang="en-US" dirty="0" smtClean="0"/>
-              <a:t>session</a:t>
-            </a:r>
-          </a:p>
-          <a:p>
-            <a:pPr>
-              <a:spcBef>
-                <a:spcPct val="60000"/>
-              </a:spcBef>
-            </a:pPr>
-            <a:r>
-              <a:rPr lang="en-US" dirty="0" smtClean="0"/>
-              <a:t>Please, feel free to ask questions at any time</a:t>
-            </a:r>
-          </a:p>
-        </p:txBody>
-      </p:sp>
-      <p:sp>
-        <p:nvSpPr>
-          <p:cNvPr id="249860" name="Text Box 4"/>
-          <p:cNvSpPr txBox="1">
-            <a:spLocks noChangeArrowheads="1"/>
-          </p:cNvSpPr>
-          <p:nvPr/>
-        </p:nvSpPr>
-        <p:spPr bwMode="auto">
-          <a:xfrm>
-            <a:off x="281873" y="4997450"/>
-            <a:ext cx="8470900" cy="488950"/>
-          </a:xfrm>
-          <a:prstGeom prst="rect">
-            <a:avLst/>
-          </a:prstGeom>
-          <a:noFill/>
-          <a:ln w="9525">
-            <a:noFill/>
-            <a:miter lim="800000"/>
-            <a:headEnd/>
-            <a:tailEnd/>
-          </a:ln>
-          <a:effectLst/>
-        </p:spPr>
-        <p:txBody>
-          <a:bodyPr>
-            <a:spAutoFit/>
-          </a:bodyPr>
-          <a:lstStyle/>
-          <a:p>
-            <a:pPr marL="342900" indent="-342900" algn="ctr" eaLnBrk="1" hangingPunct="1">
-              <a:spcBef>
-                <a:spcPct val="50000"/>
-              </a:spcBef>
-              <a:buSzPct val="70000"/>
-              <a:buFont typeface="Wingdings" pitchFamily="2" charset="2"/>
-              <a:buNone/>
-            </a:pPr>
-            <a:r>
-              <a:rPr lang="en-US" sz="2600" dirty="0">
-                <a:latin typeface="Helvetica" pitchFamily="34" charset="0"/>
-              </a:rPr>
-              <a:t>Thank you for your cooperation!</a:t>
-            </a:r>
-          </a:p>
-        </p:txBody>
-      </p:sp>
-    </p:spTree>
-  </p:cSld>
-  <p:clrMapOvr>
-    <a:masterClrMapping/>
-  </p:clrMapOvr>
-  <p:transition xmlns:p14="http://schemas.microsoft.com/office/powerpoint/2010/main"/>
-  <p:timing>
-    <p:tnLst>
-      <p:par>
-        <p:cTn xmlns:p14="http://schemas.microsoft.com/office/powerpoint/2010/main" id="1" dur="indefinite" restart="never" nodeType="tmRoot"/>
-      </p:par>
-    </p:tnLst>
-  </p:timing>
-</p:sld>
-</file>
-
-<file path=ppt/slides/slide20.xml><?xml version="1.0" encoding="utf-8"?>
-<p:sld xmlns:a="http://schemas.openxmlformats.org/drawingml/2006/main" xmlns:r="http://schemas.openxmlformats.org/officeDocument/2006/relationships" xmlns:p="http://schemas.openxmlformats.org/presentationml/2006/main">
-  <p:cSld>
-    <p:spTree>
-      <p:nvGrpSpPr>
-        <p:cNvPr id="1" name=""/>
-        <p:cNvGrpSpPr/>
-        <p:nvPr/>
-      </p:nvGrpSpPr>
-      <p:grpSpPr>
-        <a:xfrm>
-          <a:off x="0" y="0"/>
-          <a:ext cx="0" cy="0"/>
-          <a:chOff x="0" y="0"/>
-          <a:chExt cx="0" cy="0"/>
-        </a:xfrm>
-      </p:grpSpPr>
-      <p:sp>
-        <p:nvSpPr>
           <p:cNvPr id="4" name="Date Placeholder 3"/>
           <p:cNvSpPr>
             <a:spLocks noGrp="1"/>
@@ -7090,7 +7417,7 @@
           <a:p>
             <a:fld id="{564CF2E0-CCC4-4E1E-9902-C3C36AB3FDA4}" type="datetimeFigureOut">
               <a:rPr lang="en-US" smtClean="0"/>
-              <a:t>9/27/14</a:t>
+              <a:t>9/28/14</a:t>
             </a:fld>
             <a:endParaRPr lang="en-US" dirty="0"/>
           </a:p>
@@ -7146,88 +7473,6 @@
 </p:sld>
 </file>
 
-<file path=ppt/slides/slide21.xml><?xml version="1.0" encoding="utf-8"?>
-<p:sld xmlns:a="http://schemas.openxmlformats.org/drawingml/2006/main" xmlns:r="http://schemas.openxmlformats.org/officeDocument/2006/relationships" xmlns:p="http://schemas.openxmlformats.org/presentationml/2006/main">
-  <p:cSld>
-    <p:spTree>
-      <p:nvGrpSpPr>
-        <p:cNvPr id="1" name=""/>
-        <p:cNvGrpSpPr/>
-        <p:nvPr/>
-      </p:nvGrpSpPr>
-      <p:grpSpPr>
-        <a:xfrm>
-          <a:off x="0" y="0"/>
-          <a:ext cx="0" cy="0"/>
-          <a:chOff x="0" y="0"/>
-          <a:chExt cx="0" cy="0"/>
-        </a:xfrm>
-      </p:grpSpPr>
-      <p:sp>
-        <p:nvSpPr>
-          <p:cNvPr id="2" name="Title 1"/>
-          <p:cNvSpPr>
-            <a:spLocks noGrp="1"/>
-          </p:cNvSpPr>
-          <p:nvPr>
-            <p:ph type="title"/>
-          </p:nvPr>
-        </p:nvSpPr>
-        <p:spPr>
-          <a:xfrm>
-            <a:off x="838200" y="1066800"/>
-            <a:ext cx="6781800" cy="1600200"/>
-          </a:xfrm>
-        </p:spPr>
-        <p:txBody>
-          <a:bodyPr/>
-          <a:lstStyle/>
-          <a:p>
-            <a:pPr algn="ctr"/>
-            <a:r>
-              <a:rPr lang="en-US" dirty="0" smtClean="0"/>
-              <a:t>Demo Time!!!</a:t>
-            </a:r>
-            <a:endParaRPr lang="en-US" dirty="0"/>
-          </a:p>
-        </p:txBody>
-      </p:sp>
-      <p:sp>
-        <p:nvSpPr>
-          <p:cNvPr id="4" name="Date Placeholder 3"/>
-          <p:cNvSpPr>
-            <a:spLocks noGrp="1"/>
-          </p:cNvSpPr>
-          <p:nvPr>
-            <p:ph type="dt" sz="half" idx="10"/>
-          </p:nvPr>
-        </p:nvSpPr>
-        <p:spPr/>
-        <p:txBody>
-          <a:bodyPr/>
-          <a:lstStyle/>
-          <a:p>
-            <a:fld id="{564CF2E0-CCC4-4E1E-9902-C3C36AB3FDA4}" type="datetimeFigureOut">
-              <a:rPr lang="en-US" smtClean="0"/>
-              <a:t>9/27/14</a:t>
-            </a:fld>
-            <a:endParaRPr lang="en-US" dirty="0"/>
-          </a:p>
-        </p:txBody>
-      </p:sp>
-    </p:spTree>
-    <p:extLst>
-      <p:ext uri="{BB962C8B-B14F-4D97-AF65-F5344CB8AC3E}">
-        <p14:creationId xmlns:p14="http://schemas.microsoft.com/office/powerpoint/2010/main" val="529376983"/>
-      </p:ext>
-    </p:extLst>
-  </p:cSld>
-  <p:clrMapOvr>
-    <a:masterClrMapping/>
-  </p:clrMapOvr>
-</p:sld>
-</file>
-
 <file path=ppt/slides/slide22.xml><?xml version="1.0" encoding="utf-8"?>
 <p:sld xmlns:a="http://schemas.openxmlformats.org/drawingml/2006/main" xmlns:r="http://schemas.openxmlformats.org/officeDocument/2006/relationships" xmlns:p="http://schemas.openxmlformats.org/presentationml/2006/main">
   <p:cSld>
@@ -7257,6 +7502,88 @@
         </p:nvSpPr>
         <p:spPr>
           <a:xfrm>
+            <a:off x="838200" y="1066800"/>
+            <a:ext cx="6781800" cy="1600200"/>
+          </a:xfrm>
+        </p:spPr>
+        <p:txBody>
+          <a:bodyPr/>
+          <a:lstStyle/>
+          <a:p>
+            <a:pPr algn="ctr"/>
+            <a:r>
+              <a:rPr lang="en-US" dirty="0" smtClean="0"/>
+              <a:t>Demo Time!!!</a:t>
+            </a:r>
+            <a:endParaRPr lang="en-US" dirty="0"/>
+          </a:p>
+        </p:txBody>
+      </p:sp>
+      <p:sp>
+        <p:nvSpPr>
+          <p:cNvPr id="4" name="Date Placeholder 3"/>
+          <p:cNvSpPr>
+            <a:spLocks noGrp="1"/>
+          </p:cNvSpPr>
+          <p:nvPr>
+            <p:ph type="dt" sz="half" idx="10"/>
+          </p:nvPr>
+        </p:nvSpPr>
+        <p:spPr/>
+        <p:txBody>
+          <a:bodyPr/>
+          <a:lstStyle/>
+          <a:p>
+            <a:fld id="{564CF2E0-CCC4-4E1E-9902-C3C36AB3FDA4}" type="datetimeFigureOut">
+              <a:rPr lang="en-US" smtClean="0"/>
+              <a:t>9/28/14</a:t>
+            </a:fld>
+            <a:endParaRPr lang="en-US" dirty="0"/>
+          </a:p>
+        </p:txBody>
+      </p:sp>
+    </p:spTree>
+    <p:extLst>
+      <p:ext uri="{BB962C8B-B14F-4D97-AF65-F5344CB8AC3E}">
+        <p14:creationId xmlns:p14="http://schemas.microsoft.com/office/powerpoint/2010/main" val="529376983"/>
+      </p:ext>
+    </p:extLst>
+  </p:cSld>
+  <p:clrMapOvr>
+    <a:masterClrMapping/>
+  </p:clrMapOvr>
+</p:sld>
+</file>
+
+<file path=ppt/slides/slide23.xml><?xml version="1.0" encoding="utf-8"?>
+<p:sld xmlns:a="http://schemas.openxmlformats.org/drawingml/2006/main" xmlns:r="http://schemas.openxmlformats.org/officeDocument/2006/relationships" xmlns:p="http://schemas.openxmlformats.org/presentationml/2006/main">
+  <p:cSld>
+    <p:spTree>
+      <p:nvGrpSpPr>
+        <p:cNvPr id="1" name=""/>
+        <p:cNvGrpSpPr/>
+        <p:nvPr/>
+      </p:nvGrpSpPr>
+      <p:grpSpPr>
+        <a:xfrm>
+          <a:off x="0" y="0"/>
+          <a:ext cx="0" cy="0"/>
+          <a:chOff x="0" y="0"/>
+          <a:chExt cx="0" cy="0"/>
+        </a:xfrm>
+      </p:grpSpPr>
+      <p:sp>
+        <p:nvSpPr>
+          <p:cNvPr id="2" name="Title 1"/>
+          <p:cNvSpPr>
+            <a:spLocks noGrp="1"/>
+          </p:cNvSpPr>
+          <p:nvPr>
+            <p:ph type="title"/>
+          </p:nvPr>
+        </p:nvSpPr>
+        <p:spPr>
+          <a:xfrm>
             <a:off x="990600" y="990600"/>
             <a:ext cx="6781800" cy="1219200"/>
           </a:xfrm>
@@ -7269,7 +7596,11 @@
           <a:p>
             <a:r>
               <a:rPr lang="en-US" sz="4000" dirty="0" smtClean="0"/>
-              <a:t>Building and Deploying XE </a:t>
+              <a:t>“Building” </a:t>
+            </a:r>
+            <a:r>
+              <a:rPr lang="en-US" sz="4000" dirty="0" smtClean="0"/>
+              <a:t>and Deploying XE </a:t>
             </a:r>
             <a:r>
               <a:rPr lang="en-US" sz="4000" dirty="0" err="1" smtClean="0"/>
@@ -7512,7 +7843,7 @@
           <a:p>
             <a:fld id="{564CF2E0-CCC4-4E1E-9902-C3C36AB3FDA4}" type="datetimeFigureOut">
               <a:rPr lang="en-US" smtClean="0"/>
-              <a:t>9/27/14</a:t>
+              <a:t>9/28/14</a:t>
             </a:fld>
             <a:endParaRPr lang="en-US" dirty="0"/>
           </a:p>
@@ -7591,213 +7922,6 @@
 </p:sld>
 </file>
 
-<file path=ppt/slides/slide23.xml><?xml version="1.0" encoding="utf-8"?>
-<p:sld xmlns:a="http://schemas.openxmlformats.org/drawingml/2006/main" xmlns:r="http://schemas.openxmlformats.org/officeDocument/2006/relationships" xmlns:p="http://schemas.openxmlformats.org/presentationml/2006/main">
-  <p:cSld>
-    <p:spTree>
-      <p:nvGrpSpPr>
-        <p:cNvPr id="1" name=""/>
-        <p:cNvGrpSpPr/>
-        <p:nvPr/>
-      </p:nvGrpSpPr>
-      <p:grpSpPr>
-        <a:xfrm>
-          <a:off x="0" y="0"/>
-          <a:ext cx="0" cy="0"/>
-          <a:chOff x="0" y="0"/>
-          <a:chExt cx="0" cy="0"/>
-        </a:xfrm>
-      </p:grpSpPr>
-      <p:sp>
-        <p:nvSpPr>
-          <p:cNvPr id="3" name="Content Placeholder 2"/>
-          <p:cNvSpPr>
-            <a:spLocks noGrp="1"/>
-          </p:cNvSpPr>
-          <p:nvPr>
-            <p:ph idx="1"/>
-          </p:nvPr>
-        </p:nvSpPr>
-        <p:spPr>
-          <a:xfrm>
-            <a:off x="685800" y="990600"/>
-            <a:ext cx="7543800" cy="5029200"/>
-          </a:xfrm>
-        </p:spPr>
-        <p:txBody>
-          <a:bodyPr>
-            <a:normAutofit/>
-          </a:bodyPr>
-          <a:lstStyle/>
-          <a:p>
-            <a:r>
-              <a:rPr lang="en-US" dirty="0" smtClean="0"/>
-              <a:t>Create a temporary directory to work from</a:t>
-            </a:r>
-          </a:p>
-          <a:p>
-            <a:pPr lvl="1"/>
-            <a:r>
-              <a:rPr lang="en-US" dirty="0" err="1"/>
-              <a:t>m</a:t>
-            </a:r>
-            <a:r>
-              <a:rPr lang="en-US" dirty="0" err="1" smtClean="0"/>
-              <a:t>kdir</a:t>
-            </a:r>
-            <a:r>
-              <a:rPr lang="en-US" dirty="0" smtClean="0"/>
-              <a:t> </a:t>
-            </a:r>
-            <a:r>
-              <a:rPr lang="en-US" dirty="0"/>
-              <a:t>$HOME/ban9temp</a:t>
-            </a:r>
-            <a:endParaRPr lang="en-US" dirty="0" smtClean="0"/>
-          </a:p>
-          <a:p>
-            <a:pPr lvl="1"/>
-            <a:r>
-              <a:rPr lang="en-US" dirty="0" smtClean="0"/>
-              <a:t>cd </a:t>
-            </a:r>
-            <a:r>
-              <a:rPr lang="en-US" dirty="0"/>
-              <a:t>$HOME/</a:t>
-            </a:r>
-            <a:r>
-              <a:rPr lang="en-US" dirty="0" smtClean="0"/>
-              <a:t>ban9temp</a:t>
-            </a:r>
-          </a:p>
-          <a:p>
-            <a:pPr lvl="1"/>
-            <a:r>
-              <a:rPr lang="en-US" dirty="0" smtClean="0"/>
-              <a:t>unzip where-ever/release</a:t>
-            </a:r>
-            <a:r>
-              <a:rPr lang="en-US" dirty="0"/>
-              <a:t>-StudentFacultyGradeEntry-9.2.0.1.</a:t>
-            </a:r>
-            <a:r>
-              <a:rPr lang="en-US" dirty="0" smtClean="0"/>
-              <a:t>zip</a:t>
-            </a:r>
-          </a:p>
-          <a:p>
-            <a:pPr lvl="1"/>
-            <a:r>
-              <a:rPr lang="en-US" dirty="0"/>
-              <a:t>c</a:t>
-            </a:r>
-            <a:r>
-              <a:rPr lang="en-US" dirty="0" smtClean="0"/>
-              <a:t>d installer</a:t>
-            </a:r>
-          </a:p>
-          <a:p>
-            <a:pPr lvl="1"/>
-            <a:r>
-              <a:rPr lang="en-US" dirty="0" err="1"/>
-              <a:t>c</a:t>
-            </a:r>
-            <a:r>
-              <a:rPr lang="en-US" dirty="0" err="1" smtClean="0"/>
-              <a:t>hmod</a:t>
-            </a:r>
-            <a:r>
-              <a:rPr lang="en-US" dirty="0" smtClean="0"/>
-              <a:t> +x ant</a:t>
-            </a:r>
-          </a:p>
-          <a:p>
-            <a:pPr lvl="1"/>
-            <a:r>
-              <a:rPr lang="en-US" dirty="0" smtClean="0"/>
-              <a:t>./ant</a:t>
-            </a:r>
-          </a:p>
-          <a:p>
-            <a:pPr lvl="1"/>
-            <a:r>
-              <a:rPr lang="en-US" dirty="0"/>
-              <a:t>b</a:t>
-            </a:r>
-            <a:r>
-              <a:rPr lang="en-US" dirty="0" smtClean="0"/>
-              <a:t>in/install home</a:t>
-            </a:r>
-          </a:p>
-          <a:p>
-            <a:pPr lvl="2"/>
-            <a:r>
-              <a:rPr lang="en-US" b="1" dirty="0" smtClean="0"/>
-              <a:t>Prompted</a:t>
-            </a:r>
-            <a:r>
-              <a:rPr lang="en-US" dirty="0" smtClean="0"/>
-              <a:t> for full path of module home &amp; shared configuration directory, we’ll use /home/</a:t>
-            </a:r>
-            <a:r>
-              <a:rPr lang="en-US" dirty="0" err="1" smtClean="0"/>
-              <a:t>xeuser</a:t>
-            </a:r>
-            <a:r>
-              <a:rPr lang="en-US" dirty="0" smtClean="0"/>
-              <a:t>/</a:t>
-            </a:r>
-            <a:r>
-              <a:rPr lang="en-US" dirty="0" err="1" smtClean="0"/>
-              <a:t>banner_test_homes</a:t>
-            </a:r>
-            <a:endParaRPr lang="en-US" dirty="0" smtClean="0"/>
-          </a:p>
-          <a:p>
-            <a:pPr lvl="1"/>
-            <a:r>
-              <a:rPr lang="en-US" dirty="0" smtClean="0"/>
-              <a:t>Go and make all your local modifications</a:t>
-            </a:r>
-          </a:p>
-        </p:txBody>
-      </p:sp>
-      <p:sp>
-        <p:nvSpPr>
-          <p:cNvPr id="4" name="Date Placeholder 3"/>
-          <p:cNvSpPr>
-            <a:spLocks noGrp="1"/>
-          </p:cNvSpPr>
-          <p:nvPr>
-            <p:ph type="dt" sz="half" idx="10"/>
-          </p:nvPr>
-        </p:nvSpPr>
-        <p:spPr/>
-        <p:txBody>
-          <a:bodyPr/>
-          <a:lstStyle/>
-          <a:p>
-            <a:fld id="{564CF2E0-CCC4-4E1E-9902-C3C36AB3FDA4}" type="datetimeFigureOut">
-              <a:rPr lang="en-US" smtClean="0"/>
-              <a:t>9/27/14</a:t>
-            </a:fld>
-            <a:endParaRPr lang="en-US" dirty="0"/>
-          </a:p>
-        </p:txBody>
-      </p:sp>
-    </p:spTree>
-    <p:extLst>
-      <p:ext uri="{BB962C8B-B14F-4D97-AF65-F5344CB8AC3E}">
-        <p14:creationId xmlns:p14="http://schemas.microsoft.com/office/powerpoint/2010/main" val="1287436280"/>
-      </p:ext>
-    </p:extLst>
-  </p:cSld>
-  <p:clrMapOvr>
-    <a:masterClrMapping/>
-  </p:clrMapOvr>
-</p:sld>
-</file>
-
 <file path=ppt/slides/slide24.xml><?xml version="1.0" encoding="utf-8"?>
 <p:sld xmlns:a="http://schemas.openxmlformats.org/drawingml/2006/main" xmlns:r="http://schemas.openxmlformats.org/officeDocument/2006/relationships" xmlns:p="http://schemas.openxmlformats.org/presentationml/2006/main">
   <p:cSld>
@@ -7827,6 +7951,213 @@
         </p:nvSpPr>
         <p:spPr>
           <a:xfrm>
+            <a:off x="685800" y="990600"/>
+            <a:ext cx="7543800" cy="5029200"/>
+          </a:xfrm>
+        </p:spPr>
+        <p:txBody>
+          <a:bodyPr>
+            <a:normAutofit/>
+          </a:bodyPr>
+          <a:lstStyle/>
+          <a:p>
+            <a:r>
+              <a:rPr lang="en-US" dirty="0" smtClean="0"/>
+              <a:t>Create a temporary directory to work from</a:t>
+            </a:r>
+          </a:p>
+          <a:p>
+            <a:pPr lvl="1"/>
+            <a:r>
+              <a:rPr lang="en-US" dirty="0" err="1"/>
+              <a:t>m</a:t>
+            </a:r>
+            <a:r>
+              <a:rPr lang="en-US" dirty="0" err="1" smtClean="0"/>
+              <a:t>kdir</a:t>
+            </a:r>
+            <a:r>
+              <a:rPr lang="en-US" dirty="0" smtClean="0"/>
+              <a:t> </a:t>
+            </a:r>
+            <a:r>
+              <a:rPr lang="en-US" dirty="0"/>
+              <a:t>$HOME/ban9temp</a:t>
+            </a:r>
+            <a:endParaRPr lang="en-US" dirty="0" smtClean="0"/>
+          </a:p>
+          <a:p>
+            <a:pPr lvl="1"/>
+            <a:r>
+              <a:rPr lang="en-US" dirty="0" smtClean="0"/>
+              <a:t>cd </a:t>
+            </a:r>
+            <a:r>
+              <a:rPr lang="en-US" dirty="0"/>
+              <a:t>$HOME/</a:t>
+            </a:r>
+            <a:r>
+              <a:rPr lang="en-US" dirty="0" smtClean="0"/>
+              <a:t>ban9temp</a:t>
+            </a:r>
+          </a:p>
+          <a:p>
+            <a:pPr lvl="1"/>
+            <a:r>
+              <a:rPr lang="en-US" dirty="0" smtClean="0"/>
+              <a:t>unzip where-ever/release</a:t>
+            </a:r>
+            <a:r>
+              <a:rPr lang="en-US" dirty="0"/>
+              <a:t>-StudentFacultyGradeEntry-9.2.0.1.</a:t>
+            </a:r>
+            <a:r>
+              <a:rPr lang="en-US" dirty="0" smtClean="0"/>
+              <a:t>zip</a:t>
+            </a:r>
+          </a:p>
+          <a:p>
+            <a:pPr lvl="1"/>
+            <a:r>
+              <a:rPr lang="en-US" dirty="0"/>
+              <a:t>c</a:t>
+            </a:r>
+            <a:r>
+              <a:rPr lang="en-US" dirty="0" smtClean="0"/>
+              <a:t>d installer</a:t>
+            </a:r>
+          </a:p>
+          <a:p>
+            <a:pPr lvl="1"/>
+            <a:r>
+              <a:rPr lang="en-US" dirty="0" err="1"/>
+              <a:t>c</a:t>
+            </a:r>
+            <a:r>
+              <a:rPr lang="en-US" dirty="0" err="1" smtClean="0"/>
+              <a:t>hmod</a:t>
+            </a:r>
+            <a:r>
+              <a:rPr lang="en-US" dirty="0" smtClean="0"/>
+              <a:t> +x ant</a:t>
+            </a:r>
+          </a:p>
+          <a:p>
+            <a:pPr lvl="1"/>
+            <a:r>
+              <a:rPr lang="en-US" dirty="0" smtClean="0"/>
+              <a:t>./ant</a:t>
+            </a:r>
+          </a:p>
+          <a:p>
+            <a:pPr lvl="1"/>
+            <a:r>
+              <a:rPr lang="en-US" dirty="0"/>
+              <a:t>b</a:t>
+            </a:r>
+            <a:r>
+              <a:rPr lang="en-US" dirty="0" smtClean="0"/>
+              <a:t>in/install home</a:t>
+            </a:r>
+          </a:p>
+          <a:p>
+            <a:pPr lvl="2"/>
+            <a:r>
+              <a:rPr lang="en-US" b="1" dirty="0" smtClean="0"/>
+              <a:t>Prompted</a:t>
+            </a:r>
+            <a:r>
+              <a:rPr lang="en-US" dirty="0" smtClean="0"/>
+              <a:t> for full path of module home &amp; shared configuration directory, we’ll use /home/</a:t>
+            </a:r>
+            <a:r>
+              <a:rPr lang="en-US" dirty="0" err="1" smtClean="0"/>
+              <a:t>xeuser</a:t>
+            </a:r>
+            <a:r>
+              <a:rPr lang="en-US" dirty="0" smtClean="0"/>
+              <a:t>/</a:t>
+            </a:r>
+            <a:r>
+              <a:rPr lang="en-US" dirty="0" err="1" smtClean="0"/>
+              <a:t>banner_test_homes</a:t>
+            </a:r>
+            <a:endParaRPr lang="en-US" dirty="0" smtClean="0"/>
+          </a:p>
+          <a:p>
+            <a:pPr lvl="1"/>
+            <a:r>
+              <a:rPr lang="en-US" dirty="0" smtClean="0"/>
+              <a:t>Go and make all your local modifications</a:t>
+            </a:r>
+          </a:p>
+        </p:txBody>
+      </p:sp>
+      <p:sp>
+        <p:nvSpPr>
+          <p:cNvPr id="4" name="Date Placeholder 3"/>
+          <p:cNvSpPr>
+            <a:spLocks noGrp="1"/>
+          </p:cNvSpPr>
+          <p:nvPr>
+            <p:ph type="dt" sz="half" idx="10"/>
+          </p:nvPr>
+        </p:nvSpPr>
+        <p:spPr/>
+        <p:txBody>
+          <a:bodyPr/>
+          <a:lstStyle/>
+          <a:p>
+            <a:fld id="{564CF2E0-CCC4-4E1E-9902-C3C36AB3FDA4}" type="datetimeFigureOut">
+              <a:rPr lang="en-US" smtClean="0"/>
+              <a:t>9/28/14</a:t>
+            </a:fld>
+            <a:endParaRPr lang="en-US" dirty="0"/>
+          </a:p>
+        </p:txBody>
+      </p:sp>
+    </p:spTree>
+    <p:extLst>
+      <p:ext uri="{BB962C8B-B14F-4D97-AF65-F5344CB8AC3E}">
+        <p14:creationId xmlns:p14="http://schemas.microsoft.com/office/powerpoint/2010/main" val="1287436280"/>
+      </p:ext>
+    </p:extLst>
+  </p:cSld>
+  <p:clrMapOvr>
+    <a:masterClrMapping/>
+  </p:clrMapOvr>
+</p:sld>
+</file>
+
+<file path=ppt/slides/slide25.xml><?xml version="1.0" encoding="utf-8"?>
+<p:sld xmlns:a="http://schemas.openxmlformats.org/drawingml/2006/main" xmlns:r="http://schemas.openxmlformats.org/officeDocument/2006/relationships" xmlns:p="http://schemas.openxmlformats.org/presentationml/2006/main">
+  <p:cSld>
+    <p:spTree>
+      <p:nvGrpSpPr>
+        <p:cNvPr id="1" name=""/>
+        <p:cNvGrpSpPr/>
+        <p:nvPr/>
+      </p:nvGrpSpPr>
+      <p:grpSpPr>
+        <a:xfrm>
+          <a:off x="0" y="0"/>
+          <a:ext cx="0" cy="0"/>
+          <a:chOff x="0" y="0"/>
+          <a:chExt cx="0" cy="0"/>
+        </a:xfrm>
+      </p:grpSpPr>
+      <p:sp>
+        <p:nvSpPr>
+          <p:cNvPr id="3" name="Content Placeholder 2"/>
+          <p:cNvSpPr>
+            <a:spLocks noGrp="1"/>
+          </p:cNvSpPr>
+          <p:nvPr>
+            <p:ph idx="1"/>
+          </p:nvPr>
+        </p:nvSpPr>
+        <p:spPr>
+          <a:xfrm>
             <a:off x="762000" y="685800"/>
             <a:ext cx="7543800" cy="5486400"/>
           </a:xfrm>
@@ -7968,7 +8299,7 @@
           <a:p>
             <a:fld id="{564CF2E0-CCC4-4E1E-9902-C3C36AB3FDA4}" type="datetimeFigureOut">
               <a:rPr lang="en-US" smtClean="0"/>
-              <a:t>9/27/14</a:t>
+              <a:t>9/28/14</a:t>
             </a:fld>
             <a:endParaRPr lang="en-US" dirty="0"/>
           </a:p>
@@ -7994,7 +8325,7 @@
 </p:sld>
 </file>
 
-<file path=ppt/slides/slide25.xml><?xml version="1.0" encoding="utf-8"?>
+<file path=ppt/slides/slide26.xml><?xml version="1.0" encoding="utf-8"?>
 <p:sld xmlns:a="http://schemas.openxmlformats.org/drawingml/2006/main" xmlns:r="http://schemas.openxmlformats.org/officeDocument/2006/relationships" xmlns:p="http://schemas.openxmlformats.org/presentationml/2006/main" showMasterPhAnim="0">
   <p:cSld>
     <p:spTree>
@@ -8067,7 +8398,7 @@
         </p:spPr>
         <p:txBody>
           <a:bodyPr>
-            <a:normAutofit fontScale="85000" lnSpcReduction="20000"/>
+            <a:normAutofit fontScale="70000" lnSpcReduction="20000"/>
           </a:bodyPr>
           <a:lstStyle/>
           <a:p>
@@ -8149,15 +8480,26 @@
             </a:pPr>
             <a:r>
               <a:rPr lang="en-US" sz="2600" dirty="0"/>
+              <a:t>http://git-</a:t>
+            </a:r>
+            <a:r>
+              <a:rPr lang="en-US" sz="2600" dirty="0" smtClean="0"/>
+              <a:t>scm.com</a:t>
+            </a:r>
+          </a:p>
+          <a:p>
+            <a:pPr>
+              <a:spcBef>
+                <a:spcPct val="60000"/>
+              </a:spcBef>
+            </a:pPr>
+            <a:r>
+              <a:rPr lang="en-US" sz="2600" dirty="0" smtClean="0"/>
               <a:t>http://</a:t>
             </a:r>
             <a:r>
-              <a:rPr lang="en-US" sz="2600" dirty="0" err="1"/>
-              <a:t>git-</a:t>
-            </a:r>
-            <a:r>
               <a:rPr lang="en-US" sz="2600" dirty="0" err="1" smtClean="0"/>
-              <a:t>scm.com</a:t>
+              <a:t>www.packer.io</a:t>
             </a:r>
             <a:endParaRPr lang="en-US" sz="2600" dirty="0"/>
           </a:p>
@@ -8219,77 +8561,6 @@
   <p:transition xmlns:p14="http://schemas.microsoft.com/office/powerpoint/2010/main">
     <p:fade/>
   </p:transition>
-  <p:timing>
-    <p:tnLst>
-      <p:par>
-        <p:cTn xmlns:p14="http://schemas.microsoft.com/office/powerpoint/2010/main" id="1" dur="indefinite" restart="never" nodeType="tmRoot"/>
-      </p:par>
-    </p:tnLst>
-  </p:timing>
-</p:sld>
-</file>
-
-<file path=ppt/slides/slide26.xml><?xml version="1.0" encoding="utf-8"?>
-<p:sld xmlns:a="http://schemas.openxmlformats.org/drawingml/2006/main" xmlns:r="http://schemas.openxmlformats.org/officeDocument/2006/relationships" xmlns:p="http://schemas.openxmlformats.org/presentationml/2006/main">
-  <p:cSld>
-    <p:spTree>
-      <p:nvGrpSpPr>
-        <p:cNvPr id="1" name=""/>
-        <p:cNvGrpSpPr/>
-        <p:nvPr/>
-      </p:nvGrpSpPr>
-      <p:grpSpPr>
-        <a:xfrm>
-          <a:off x="0" y="0"/>
-          <a:ext cx="0" cy="0"/>
-          <a:chOff x="0" y="0"/>
-          <a:chExt cx="0" cy="0"/>
-        </a:xfrm>
-      </p:grpSpPr>
-      <p:sp>
-        <p:nvSpPr>
-          <p:cNvPr id="121858" name="Rectangle 2"/>
-          <p:cNvSpPr>
-            <a:spLocks noGrp="1" noChangeArrowheads="1"/>
-          </p:cNvSpPr>
-          <p:nvPr>
-            <p:ph type="title"/>
-          </p:nvPr>
-        </p:nvSpPr>
-        <p:spPr>
-          <a:xfrm>
-            <a:off x="533400" y="1676400"/>
-            <a:ext cx="8229600" cy="704088"/>
-          </a:xfrm>
-        </p:spPr>
-        <p:txBody>
-          <a:bodyPr>
-            <a:normAutofit fontScale="90000"/>
-          </a:bodyPr>
-          <a:lstStyle/>
-          <a:p>
-            <a:r>
-              <a:rPr lang="en-US" dirty="0" smtClean="0">
-                <a:solidFill>
-                  <a:srgbClr val="0062AC"/>
-                </a:solidFill>
-              </a:rPr>
-              <a:t>Questions &amp; Answers</a:t>
-            </a:r>
-            <a:endParaRPr lang="en-US" dirty="0">
-              <a:solidFill>
-                <a:srgbClr val="0062AC"/>
-              </a:solidFill>
-            </a:endParaRPr>
-          </a:p>
-        </p:txBody>
-      </p:sp>
-    </p:spTree>
-  </p:cSld>
-  <p:clrMapOvr>
-    <a:masterClrMapping/>
-  </p:clrMapOvr>
-  <p:transition xmlns:p14="http://schemas.microsoft.com/office/powerpoint/2010/main"/>
   <p:timing>
     <p:tnLst>
       <p:par>
@@ -8481,7 +8752,7 @@
           <a:p>
             <a:fld id="{564CF2E0-CCC4-4E1E-9902-C3C36AB3FDA4}" type="datetimeFigureOut">
               <a:rPr lang="en-US" smtClean="0"/>
-              <a:t>9/27/14</a:t>
+              <a:t>9/28/14</a:t>
             </a:fld>
             <a:endParaRPr lang="en-US" dirty="0"/>
           </a:p>
@@ -8508,6 +8779,77 @@
 </file>
 
 <file path=ppt/slides/slide28.xml><?xml version="1.0" encoding="utf-8"?>
+<p:sld xmlns:a="http://schemas.openxmlformats.org/drawingml/2006/main" xmlns:r="http://schemas.openxmlformats.org/officeDocument/2006/relationships" xmlns:p="http://schemas.openxmlformats.org/presentationml/2006/main">
+  <p:cSld>
+    <p:spTree>
+      <p:nvGrpSpPr>
+        <p:cNvPr id="1" name=""/>
+        <p:cNvGrpSpPr/>
+        <p:nvPr/>
+      </p:nvGrpSpPr>
+      <p:grpSpPr>
+        <a:xfrm>
+          <a:off x="0" y="0"/>
+          <a:ext cx="0" cy="0"/>
+          <a:chOff x="0" y="0"/>
+          <a:chExt cx="0" cy="0"/>
+        </a:xfrm>
+      </p:grpSpPr>
+      <p:sp>
+        <p:nvSpPr>
+          <p:cNvPr id="121858" name="Rectangle 2"/>
+          <p:cNvSpPr>
+            <a:spLocks noGrp="1" noChangeArrowheads="1"/>
+          </p:cNvSpPr>
+          <p:nvPr>
+            <p:ph type="title"/>
+          </p:nvPr>
+        </p:nvSpPr>
+        <p:spPr>
+          <a:xfrm>
+            <a:off x="533400" y="1676400"/>
+            <a:ext cx="8229600" cy="704088"/>
+          </a:xfrm>
+        </p:spPr>
+        <p:txBody>
+          <a:bodyPr>
+            <a:normAutofit fontScale="90000"/>
+          </a:bodyPr>
+          <a:lstStyle/>
+          <a:p>
+            <a:r>
+              <a:rPr lang="en-US" dirty="0" smtClean="0">
+                <a:solidFill>
+                  <a:srgbClr val="0062AC"/>
+                </a:solidFill>
+              </a:rPr>
+              <a:t>Questions &amp; Answers</a:t>
+            </a:r>
+            <a:endParaRPr lang="en-US" dirty="0">
+              <a:solidFill>
+                <a:srgbClr val="0062AC"/>
+              </a:solidFill>
+            </a:endParaRPr>
+          </a:p>
+        </p:txBody>
+      </p:sp>
+    </p:spTree>
+  </p:cSld>
+  <p:clrMapOvr>
+    <a:masterClrMapping/>
+  </p:clrMapOvr>
+  <p:transition xmlns:p14="http://schemas.microsoft.com/office/powerpoint/2010/main"/>
+  <p:timing>
+    <p:tnLst>
+      <p:par>
+        <p:cTn xmlns:p14="http://schemas.microsoft.com/office/powerpoint/2010/main" id="1" dur="indefinite" restart="never" nodeType="tmRoot"/>
+      </p:par>
+    </p:tnLst>
+  </p:timing>
+</p:sld>
+</file>
+
+<file path=ppt/slides/slide29.xml><?xml version="1.0" encoding="utf-8"?>
 <p:sld xmlns:a="http://schemas.openxmlformats.org/drawingml/2006/main" xmlns:r="http://schemas.openxmlformats.org/officeDocument/2006/relationships" xmlns:p="http://schemas.openxmlformats.org/presentationml/2006/main">
   <p:cSld>
     <p:spTree>
@@ -9714,7 +10056,7 @@
         </p:spPr>
         <p:txBody>
           <a:bodyPr>
-            <a:normAutofit lnSpcReduction="10000"/>
+            <a:normAutofit fontScale="92500"/>
           </a:bodyPr>
           <a:lstStyle/>
           <a:p>
@@ -9787,8 +10129,13 @@
             </a:pPr>
             <a:r>
               <a:rPr lang="en-US" sz="2600" dirty="0" smtClean="0"/>
-              <a:t>Classic “but it ran ok on my Desktop” scenario</a:t>
-            </a:r>
+              <a:t>Classic “but it ran ok on my Desktop” </a:t>
+            </a:r>
+            <a:r>
+              <a:rPr lang="en-US" sz="2600" dirty="0" smtClean="0"/>
+              <a:t>scenario, which lead to…</a:t>
+            </a:r>
+            <a:endParaRPr lang="en-US" sz="2600" dirty="0" smtClean="0"/>
           </a:p>
           <a:p>
             <a:pPr marL="0" indent="0">
@@ -9858,7 +10205,7 @@
           <a:p>
             <a:fld id="{564CF2E0-CCC4-4E1E-9902-C3C36AB3FDA4}" type="datetimeFigureOut">
               <a:rPr lang="en-US" smtClean="0"/>
-              <a:t>9/27/14</a:t>
+              <a:t>9/28/14</a:t>
             </a:fld>
             <a:endParaRPr lang="en-US" dirty="0"/>
           </a:p>

</xml_diff>

<commit_message>
added note about using vagrant plugin for testing
</commit_message>
<xml_diff>
--- a/MABUG2014-8743.pptx
+++ b/MABUG2014-8743.pptx
@@ -913,7 +913,21 @@
             </a:r>
             <a:r>
               <a:rPr lang="en-US" baseline="0" dirty="0" smtClean="0"/>
-              <a:t> can communicate using various methods – jabber, email…</a:t>
+              <a:t> can communicate using various methods – jabber, email</a:t>
+            </a:r>
+            <a:r>
+              <a:rPr lang="en-US" baseline="0" dirty="0" smtClean="0"/>
+              <a:t>…</a:t>
+            </a:r>
+          </a:p>
+          <a:p>
+            <a:r>
+              <a:rPr lang="en-US" baseline="0" dirty="0" smtClean="0"/>
+              <a:t>Has a “Vagrant” plugin, can spin up a VM to run </a:t>
+            </a:r>
+            <a:r>
+              <a:rPr lang="en-US" baseline="0" smtClean="0"/>
+              <a:t>tests with</a:t>
             </a:r>
             <a:endParaRPr lang="en-US" dirty="0"/>
           </a:p>
@@ -1866,11 +1880,7 @@
             </a:r>
             <a:r>
               <a:rPr lang="en-US" baseline="0" dirty="0" smtClean="0"/>
-              <a:t> shame via jabber conference room.  Never leave a build </a:t>
-            </a:r>
-            <a:r>
-              <a:rPr lang="en-US" baseline="0" dirty="0" smtClean="0"/>
-              <a:t>broke</a:t>
+              <a:t> shame via jabber conference room.  Never leave a build broke</a:t>
             </a:r>
           </a:p>
           <a:p>
@@ -5807,11 +5817,7 @@
             </a:pPr>
             <a:r>
               <a:rPr lang="en-US" sz="3000" dirty="0" smtClean="0"/>
-              <a:t>Slows down the </a:t>
-            </a:r>
-            <a:r>
-              <a:rPr lang="en-US" sz="3000" dirty="0" smtClean="0"/>
-              <a:t>process</a:t>
+              <a:t>Slows down the process</a:t>
             </a:r>
           </a:p>
           <a:p>
@@ -6000,11 +6006,7 @@
             </a:pPr>
             <a:r>
               <a:rPr lang="en-US" sz="2800" dirty="0" smtClean="0"/>
-              <a:t>Ops </a:t>
-            </a:r>
-            <a:r>
-              <a:rPr lang="en-US" sz="2800" dirty="0" smtClean="0"/>
-              <a:t>copies </a:t>
+              <a:t>Ops copies </a:t>
             </a:r>
             <a:r>
               <a:rPr lang="en-US" sz="2800" dirty="0" err="1" smtClean="0"/>
@@ -7552,6 +7554,13 @@
   <p:clrMapOvr>
     <a:masterClrMapping/>
   </p:clrMapOvr>
+  <p:timing>
+    <p:tnLst>
+      <p:par>
+        <p:cTn xmlns:p14="http://schemas.microsoft.com/office/powerpoint/2010/main" id="1" dur="indefinite" restart="never" nodeType="tmRoot"/>
+      </p:par>
+    </p:tnLst>
+  </p:timing>
 </p:sld>
 </file>
 
@@ -7596,11 +7605,7 @@
           <a:p>
             <a:r>
               <a:rPr lang="en-US" sz="4000" dirty="0" smtClean="0"/>
-              <a:t>“Building” </a:t>
-            </a:r>
-            <a:r>
-              <a:rPr lang="en-US" sz="4000" dirty="0" smtClean="0"/>
-              <a:t>and Deploying XE </a:t>
+              <a:t>“Building” and Deploying XE </a:t>
             </a:r>
             <a:r>
               <a:rPr lang="en-US" sz="4000" dirty="0" err="1" smtClean="0"/>
@@ -7919,6 +7924,13 @@
   <p:clrMapOvr>
     <a:masterClrMapping/>
   </p:clrMapOvr>
+  <p:timing>
+    <p:tnLst>
+      <p:par>
+        <p:cTn xmlns:p14="http://schemas.microsoft.com/office/powerpoint/2010/main" id="1" dur="indefinite" restart="never" nodeType="tmRoot"/>
+      </p:par>
+    </p:tnLst>
+  </p:timing>
 </p:sld>
 </file>
 
@@ -8126,6 +8138,13 @@
   <p:clrMapOvr>
     <a:masterClrMapping/>
   </p:clrMapOvr>
+  <p:timing>
+    <p:tnLst>
+      <p:par>
+        <p:cTn xmlns:p14="http://schemas.microsoft.com/office/powerpoint/2010/main" id="1" dur="indefinite" restart="never" nodeType="tmRoot"/>
+      </p:par>
+    </p:tnLst>
+  </p:timing>
 </p:sld>
 </file>
 
@@ -10129,13 +10148,8 @@
             </a:pPr>
             <a:r>
               <a:rPr lang="en-US" sz="2600" dirty="0" smtClean="0"/>
-              <a:t>Classic “but it ran ok on my Desktop” </a:t>
-            </a:r>
-            <a:r>
-              <a:rPr lang="en-US" sz="2600" dirty="0" smtClean="0"/>
-              <a:t>scenario, which lead to…</a:t>
-            </a:r>
-            <a:endParaRPr lang="en-US" sz="2600" dirty="0" smtClean="0"/>
+              <a:t>Classic “but it ran ok on my Desktop” scenario, which lead to…</a:t>
+            </a:r>
           </a:p>
           <a:p>
             <a:pPr marL="0" indent="0">

</xml_diff>

<commit_message>
add twitter and gethub info
</commit_message>
<xml_diff>
--- a/MABUG2014-8743.pptx
+++ b/MABUG2014-8743.pptx
@@ -913,11 +913,7 @@
             </a:r>
             <a:r>
               <a:rPr lang="en-US" baseline="0" dirty="0" smtClean="0"/>
-              <a:t> can communicate using various methods – jabber, email</a:t>
-            </a:r>
-            <a:r>
-              <a:rPr lang="en-US" baseline="0" dirty="0" smtClean="0"/>
-              <a:t>…</a:t>
+              <a:t> can communicate using various methods – jabber, email…</a:t>
             </a:r>
           </a:p>
           <a:p>
@@ -8995,6 +8991,27 @@
             <a:r>
               <a:rPr lang="en-US" sz="2800" dirty="0" err="1" smtClean="0"/>
               <a:t>crpeck</a:t>
+            </a:r>
+            <a:r>
+              <a:rPr lang="en-US" sz="2800" dirty="0" smtClean="0"/>
+              <a:t> on twitter</a:t>
+            </a:r>
+          </a:p>
+          <a:p>
+            <a:pPr marL="0" indent="0" algn="ctr">
+              <a:lnSpc>
+                <a:spcPct val="90000"/>
+              </a:lnSpc>
+              <a:buFontTx/>
+              <a:buNone/>
+            </a:pPr>
+            <a:r>
+              <a:rPr lang="en-US" sz="2800" dirty="0" smtClean="0"/>
+              <a:t>http://</a:t>
+            </a:r>
+            <a:r>
+              <a:rPr lang="en-US" sz="2800" dirty="0" err="1" smtClean="0"/>
+              <a:t>crpeck.gethub.io</a:t>
             </a:r>
             <a:endParaRPr lang="en-US" sz="2800" dirty="0"/>
           </a:p>

</xml_diff>

<commit_message>
last updates to powerpoint presentation - I promose
</commit_message>
<xml_diff>
--- a/MABUG2014-8743.pptx
+++ b/MABUG2014-8743.pptx
@@ -1951,7 +1951,21 @@
           <a:bodyPr/>
           <a:lstStyle/>
           <a:p>
-            <a:endParaRPr lang="en-US"/>
+            <a:r>
+              <a:rPr lang="en-US" dirty="0" smtClean="0"/>
+              <a:t>Easy to lose track of the Goal of the College, to do our best to</a:t>
+            </a:r>
+            <a:r>
+              <a:rPr lang="en-US" baseline="0" dirty="0" smtClean="0"/>
+              <a:t> “produce” graduates that can Change the World. Hopefully for the better.</a:t>
+            </a:r>
+          </a:p>
+          <a:p>
+            <a:r>
+              <a:rPr lang="en-US" baseline="0" dirty="0" smtClean="0"/>
+              <a:t>It’s our job to work together to enable that to occur.</a:t>
+            </a:r>
+            <a:endParaRPr lang="en-US" dirty="0"/>
           </a:p>
         </p:txBody>
       </p:sp>

</xml_diff>